<commit_message>
Delete a blank page
</commit_message>
<xml_diff>
--- a/doc/ppt/[MISCON]AMR_Presentation.pptx
+++ b/doc/ppt/[MISCON]AMR_Presentation.pptx
@@ -5,7 +5,7 @@
     <p:sldMasterId id="2147483648" r:id="rId1"/>
   </p:sldMasterIdLst>
   <p:notesMasterIdLst>
-    <p:notesMasterId r:id="rId30"/>
+    <p:notesMasterId r:id="rId29"/>
   </p:notesMasterIdLst>
   <p:sldIdLst>
     <p:sldId id="257" r:id="rId2"/>
@@ -30,12 +30,11 @@
     <p:sldId id="274" r:id="rId21"/>
     <p:sldId id="275" r:id="rId22"/>
     <p:sldId id="264" r:id="rId23"/>
-    <p:sldId id="284" r:id="rId24"/>
-    <p:sldId id="283" r:id="rId25"/>
-    <p:sldId id="265" r:id="rId26"/>
-    <p:sldId id="305" r:id="rId27"/>
-    <p:sldId id="266" r:id="rId28"/>
-    <p:sldId id="304" r:id="rId29"/>
+    <p:sldId id="283" r:id="rId24"/>
+    <p:sldId id="265" r:id="rId25"/>
+    <p:sldId id="305" r:id="rId26"/>
+    <p:sldId id="266" r:id="rId27"/>
+    <p:sldId id="304" r:id="rId28"/>
   </p:sldIdLst>
   <p:sldSz cx="9144000" cy="6858000" type="screen4x3"/>
   <p:notesSz cx="6858000" cy="9144000"/>
@@ -136,7 +135,7 @@
   </p:defaultTextStyle>
   <p:extLst>
     <p:ext uri="{EFAFB233-063F-42B5-8137-9DF3F51BA10A}">
-      <p15:sldGuideLst xmlns:p15="http://schemas.microsoft.com/office/powerpoint/2012/main" xmlns="">
+      <p15:sldGuideLst xmlns="" xmlns:p15="http://schemas.microsoft.com/office/powerpoint/2012/main">
         <p15:guide id="1" orient="horz" pos="2160">
           <p15:clr>
             <a:srgbClr val="A4A3A4"/>
@@ -235,7 +234,7 @@
           <a:p>
             <a:fld id="{96F07BFE-5A0E-4069-925A-3A8BF879AEAC}" type="datetimeFigureOut">
               <a:rPr lang="ko-KR" altLang="en-US" smtClean="0"/>
-              <a:t>2016-02-15</a:t>
+              <a:t>2016-02-16</a:t>
             </a:fld>
             <a:endParaRPr lang="ko-KR" altLang="en-US"/>
           </a:p>
@@ -1023,90 +1022,6 @@
 </p:notes>
 </file>
 
-<file path=ppt/notesSlides/notesSlide13.xml><?xml version="1.0" encoding="utf-8"?>
-<p:notes xmlns:a="http://schemas.openxmlformats.org/drawingml/2006/main" xmlns:r="http://schemas.openxmlformats.org/officeDocument/2006/relationships" xmlns:p="http://schemas.openxmlformats.org/presentationml/2006/main">
-  <p:cSld>
-    <p:spTree>
-      <p:nvGrpSpPr>
-        <p:cNvPr id="1" name=""/>
-        <p:cNvGrpSpPr/>
-        <p:nvPr/>
-      </p:nvGrpSpPr>
-      <p:grpSpPr>
-        <a:xfrm>
-          <a:off x="0" y="0"/>
-          <a:ext cx="0" cy="0"/>
-          <a:chOff x="0" y="0"/>
-          <a:chExt cx="0" cy="0"/>
-        </a:xfrm>
-      </p:grpSpPr>
-      <p:sp>
-        <p:nvSpPr>
-          <p:cNvPr id="2" name="슬라이드 이미지 개체 틀 1"/>
-          <p:cNvSpPr>
-            <a:spLocks noGrp="1" noRot="1" noChangeAspect="1"/>
-          </p:cNvSpPr>
-          <p:nvPr>
-            <p:ph type="sldImg"/>
-          </p:nvPr>
-        </p:nvSpPr>
-        <p:spPr/>
-      </p:sp>
-      <p:sp>
-        <p:nvSpPr>
-          <p:cNvPr id="3" name="슬라이드 노트 개체 틀 2"/>
-          <p:cNvSpPr>
-            <a:spLocks noGrp="1"/>
-          </p:cNvSpPr>
-          <p:nvPr>
-            <p:ph type="body" idx="1"/>
-          </p:nvPr>
-        </p:nvSpPr>
-        <p:spPr/>
-        <p:txBody>
-          <a:bodyPr/>
-          <a:lstStyle/>
-          <a:p>
-            <a:endParaRPr lang="ko-KR" altLang="en-US" dirty="0"/>
-          </a:p>
-        </p:txBody>
-      </p:sp>
-      <p:sp>
-        <p:nvSpPr>
-          <p:cNvPr id="4" name="슬라이드 번호 개체 틀 3"/>
-          <p:cNvSpPr>
-            <a:spLocks noGrp="1"/>
-          </p:cNvSpPr>
-          <p:nvPr>
-            <p:ph type="sldNum" sz="quarter" idx="10"/>
-          </p:nvPr>
-        </p:nvSpPr>
-        <p:spPr/>
-        <p:txBody>
-          <a:bodyPr/>
-          <a:lstStyle/>
-          <a:p>
-            <a:fld id="{0283D922-7B26-41AF-BF9C-15E942E4D10C}" type="slidenum">
-              <a:rPr lang="ko-KR" altLang="en-US" smtClean="0"/>
-              <a:t>23</a:t>
-            </a:fld>
-            <a:endParaRPr lang="ko-KR" altLang="en-US"/>
-          </a:p>
-        </p:txBody>
-      </p:sp>
-    </p:spTree>
-    <p:extLst>
-      <p:ext uri="{BB962C8B-B14F-4D97-AF65-F5344CB8AC3E}">
-        <p14:creationId xmlns:p14="http://schemas.microsoft.com/office/powerpoint/2010/main" val="131651877"/>
-      </p:ext>
-    </p:extLst>
-  </p:cSld>
-  <p:clrMapOvr>
-    <a:masterClrMapping/>
-  </p:clrMapOvr>
-</p:notes>
-</file>
-
 <file path=ppt/notesSlides/notesSlide2.xml><?xml version="1.0" encoding="utf-8"?>
 <p:notes xmlns:a="http://schemas.openxmlformats.org/drawingml/2006/main" xmlns:r="http://schemas.openxmlformats.org/officeDocument/2006/relationships" xmlns:p="http://schemas.openxmlformats.org/presentationml/2006/main">
   <p:cSld>
@@ -2120,7 +2035,7 @@
           <a:p>
             <a:fld id="{A0DCC7C7-1E40-47CD-AA0B-D23A2AAFF3AA}" type="datetime1">
               <a:rPr lang="ko-KR" altLang="en-US" smtClean="0"/>
-              <a:t>2016-02-15</a:t>
+              <a:t>2016-02-16</a:t>
             </a:fld>
             <a:endParaRPr lang="ko-KR" altLang="en-US"/>
           </a:p>
@@ -2302,7 +2217,7 @@
           <a:p>
             <a:fld id="{EB4AE650-B404-4D9B-A75D-AD5AFD2A896F}" type="datetime1">
               <a:rPr lang="ko-KR" altLang="en-US" smtClean="0"/>
-              <a:t>2016-02-15</a:t>
+              <a:t>2016-02-16</a:t>
             </a:fld>
             <a:endParaRPr lang="ko-KR" altLang="en-US"/>
           </a:p>
@@ -2482,7 +2397,7 @@
           <a:p>
             <a:fld id="{CC591735-7275-434C-B06D-2AE97D6CB648}" type="datetime1">
               <a:rPr lang="ko-KR" altLang="en-US" smtClean="0"/>
-              <a:t>2016-02-15</a:t>
+              <a:t>2016-02-16</a:t>
             </a:fld>
             <a:endParaRPr lang="ko-KR" altLang="en-US"/>
           </a:p>
@@ -2652,7 +2567,7 @@
           <a:p>
             <a:fld id="{D2885FA5-D838-40AB-AAC3-BDC6D9624129}" type="datetime1">
               <a:rPr lang="ko-KR" altLang="en-US" smtClean="0"/>
-              <a:t>2016-02-15</a:t>
+              <a:t>2016-02-16</a:t>
             </a:fld>
             <a:endParaRPr lang="ko-KR" altLang="en-US"/>
           </a:p>
@@ -2910,7 +2825,7 @@
           <a:p>
             <a:fld id="{FA00DEFD-7A22-40B6-9C5A-7E7969643AC5}" type="datetime1">
               <a:rPr lang="ko-KR" altLang="en-US" smtClean="0"/>
-              <a:t>2016-02-15</a:t>
+              <a:t>2016-02-16</a:t>
             </a:fld>
             <a:endParaRPr lang="ko-KR" altLang="en-US"/>
           </a:p>
@@ -3210,7 +3125,7 @@
           <a:p>
             <a:fld id="{A76029E4-680F-4422-8E07-29CE145633B0}" type="datetime1">
               <a:rPr lang="ko-KR" altLang="en-US" smtClean="0"/>
-              <a:t>2016-02-15</a:t>
+              <a:t>2016-02-16</a:t>
             </a:fld>
             <a:endParaRPr lang="ko-KR" altLang="en-US"/>
           </a:p>
@@ -3639,7 +3554,7 @@
           <a:p>
             <a:fld id="{2EA63398-23BF-460C-9571-373EEA2950C7}" type="datetime1">
               <a:rPr lang="ko-KR" altLang="en-US" smtClean="0"/>
-              <a:t>2016-02-15</a:t>
+              <a:t>2016-02-16</a:t>
             </a:fld>
             <a:endParaRPr lang="ko-KR" altLang="en-US"/>
           </a:p>
@@ -3764,7 +3679,7 @@
           <a:p>
             <a:fld id="{1DD42DED-F9E1-4F4A-9572-BD0115933B54}" type="datetime1">
               <a:rPr lang="ko-KR" altLang="en-US" smtClean="0"/>
-              <a:t>2016-02-15</a:t>
+              <a:t>2016-02-16</a:t>
             </a:fld>
             <a:endParaRPr lang="ko-KR" altLang="en-US"/>
           </a:p>
@@ -3859,7 +3774,7 @@
           <a:p>
             <a:fld id="{9E2195BF-9DCE-44F5-AA67-6D4A102C5DC5}" type="datetime1">
               <a:rPr lang="ko-KR" altLang="en-US" smtClean="0"/>
-              <a:t>2016-02-15</a:t>
+              <a:t>2016-02-16</a:t>
             </a:fld>
             <a:endParaRPr lang="ko-KR" altLang="en-US"/>
           </a:p>
@@ -4136,7 +4051,7 @@
           <a:p>
             <a:fld id="{B5B68E84-A085-4D57-97EB-D6038AEE8F02}" type="datetime1">
               <a:rPr lang="ko-KR" altLang="en-US" smtClean="0"/>
-              <a:t>2016-02-15</a:t>
+              <a:t>2016-02-16</a:t>
             </a:fld>
             <a:endParaRPr lang="ko-KR" altLang="en-US"/>
           </a:p>
@@ -4389,7 +4304,7 @@
           <a:p>
             <a:fld id="{3FE377B6-75B1-4A72-94A5-CD51AD3B8C6F}" type="datetime1">
               <a:rPr lang="ko-KR" altLang="en-US" smtClean="0"/>
-              <a:t>2016-02-15</a:t>
+              <a:t>2016-02-16</a:t>
             </a:fld>
             <a:endParaRPr lang="ko-KR" altLang="en-US"/>
           </a:p>
@@ -4602,7 +4517,7 @@
           <a:p>
             <a:fld id="{D8C651DC-4C7C-4A52-83D6-540EECADB68C}" type="datetime1">
               <a:rPr lang="ko-KR" altLang="en-US" smtClean="0"/>
-              <a:t>2016-02-15</a:t>
+              <a:t>2016-02-16</a:t>
             </a:fld>
             <a:endParaRPr lang="ko-KR" altLang="en-US"/>
           </a:p>
@@ -20899,6 +20814,514 @@
           <a:chExt cx="0" cy="0"/>
         </a:xfrm>
       </p:grpSpPr>
+      <p:pic>
+        <p:nvPicPr>
+          <p:cNvPr id="4" name="그림 3"/>
+          <p:cNvPicPr>
+            <a:picLocks noChangeAspect="1"/>
+          </p:cNvPicPr>
+          <p:nvPr/>
+        </p:nvPicPr>
+        <p:blipFill rotWithShape="1">
+          <a:blip r:embed="rId2">
+            <a:duotone>
+              <a:prstClr val="black"/>
+              <a:srgbClr val="D9C3A5">
+                <a:tint val="50000"/>
+                <a:satMod val="180000"/>
+              </a:srgbClr>
+            </a:duotone>
+            <a:extLst>
+              <a:ext uri="{28A0092B-C50C-407E-A947-70E740481C1C}">
+                <a14:useLocalDpi xmlns:a14="http://schemas.microsoft.com/office/drawing/2010/main" val="0"/>
+              </a:ext>
+            </a:extLst>
+          </a:blip>
+          <a:srcRect l="16739" t="18519" b="42592"/>
+          <a:stretch/>
+        </p:blipFill>
+        <p:spPr>
+          <a:xfrm>
+            <a:off x="0" y="2117452"/>
+            <a:ext cx="9136088" cy="2667000"/>
+          </a:xfrm>
+          <a:prstGeom prst="rect">
+            <a:avLst/>
+          </a:prstGeom>
+        </p:spPr>
+      </p:pic>
+      <p:sp>
+        <p:nvSpPr>
+          <p:cNvPr id="8" name="타원 7"/>
+          <p:cNvSpPr/>
+          <p:nvPr/>
+        </p:nvSpPr>
+        <p:spPr>
+          <a:xfrm>
+            <a:off x="683568" y="1412776"/>
+            <a:ext cx="4176464" cy="4176464"/>
+          </a:xfrm>
+          <a:prstGeom prst="ellipse">
+            <a:avLst/>
+          </a:prstGeom>
+          <a:solidFill>
+            <a:schemeClr val="bg1"/>
+          </a:solidFill>
+          <a:ln>
+            <a:solidFill>
+              <a:schemeClr val="bg1"/>
+            </a:solidFill>
+          </a:ln>
+        </p:spPr>
+        <p:style>
+          <a:lnRef idx="2">
+            <a:schemeClr val="accent1">
+              <a:shade val="50000"/>
+            </a:schemeClr>
+          </a:lnRef>
+          <a:fillRef idx="1">
+            <a:schemeClr val="accent1"/>
+          </a:fillRef>
+          <a:effectRef idx="0">
+            <a:schemeClr val="accent1"/>
+          </a:effectRef>
+          <a:fontRef idx="minor">
+            <a:schemeClr val="lt1"/>
+          </a:fontRef>
+        </p:style>
+        <p:txBody>
+          <a:bodyPr rtlCol="0" anchor="ctr"/>
+          <a:lstStyle/>
+          <a:p>
+            <a:pPr algn="ctr"/>
+            <a:endParaRPr lang="ko-KR" altLang="en-US"/>
+          </a:p>
+        </p:txBody>
+      </p:sp>
+      <p:grpSp>
+        <p:nvGrpSpPr>
+          <p:cNvPr id="13" name="그룹 12"/>
+          <p:cNvGrpSpPr/>
+          <p:nvPr/>
+        </p:nvGrpSpPr>
+        <p:grpSpPr>
+          <a:xfrm>
+            <a:off x="992808" y="2365137"/>
+            <a:ext cx="3149171" cy="2215991"/>
+            <a:chOff x="1342125" y="2123713"/>
+            <a:chExt cx="3149171" cy="2215991"/>
+          </a:xfrm>
+        </p:grpSpPr>
+        <p:sp>
+          <p:nvSpPr>
+            <p:cNvPr id="10" name="TextBox 9"/>
+            <p:cNvSpPr txBox="1"/>
+            <p:nvPr/>
+          </p:nvSpPr>
+          <p:spPr>
+            <a:xfrm>
+              <a:off x="2402070" y="3056371"/>
+              <a:ext cx="2089226" cy="923330"/>
+            </a:xfrm>
+            <a:prstGeom prst="rect">
+              <a:avLst/>
+            </a:prstGeom>
+            <a:noFill/>
+          </p:spPr>
+          <p:txBody>
+            <a:bodyPr wrap="none" rtlCol="0">
+              <a:spAutoFit/>
+            </a:bodyPr>
+            <a:lstStyle/>
+            <a:p>
+              <a:r>
+                <a:rPr lang="en-US" altLang="ko-KR" sz="5400" dirty="0" smtClean="0">
+                  <a:ln>
+                    <a:solidFill>
+                      <a:schemeClr val="bg1">
+                        <a:alpha val="0"/>
+                      </a:schemeClr>
+                    </a:solidFill>
+                  </a:ln>
+                  <a:solidFill>
+                    <a:srgbClr val="ADCC03"/>
+                  </a:solidFill>
+                  <a:latin typeface="맑은 고딕" panose="020B0503020000020004" pitchFamily="50" charset="-127"/>
+                  <a:ea typeface="맑은 고딕" panose="020B0503020000020004" pitchFamily="50" charset="-127"/>
+                </a:rPr>
+                <a:t>TODO</a:t>
+              </a:r>
+              <a:endParaRPr lang="ko-KR" altLang="en-US" sz="5400" dirty="0">
+                <a:ln>
+                  <a:solidFill>
+                    <a:schemeClr val="bg1">
+                      <a:alpha val="0"/>
+                    </a:schemeClr>
+                  </a:solidFill>
+                </a:ln>
+                <a:solidFill>
+                  <a:srgbClr val="ADCC03"/>
+                </a:solidFill>
+                <a:latin typeface="맑은 고딕" panose="020B0503020000020004" pitchFamily="50" charset="-127"/>
+                <a:ea typeface="맑은 고딕" panose="020B0503020000020004" pitchFamily="50" charset="-127"/>
+              </a:endParaRPr>
+            </a:p>
+          </p:txBody>
+        </p:sp>
+        <p:sp>
+          <p:nvSpPr>
+            <p:cNvPr id="11" name="TextBox 10"/>
+            <p:cNvSpPr txBox="1"/>
+            <p:nvPr/>
+          </p:nvSpPr>
+          <p:spPr>
+            <a:xfrm>
+              <a:off x="2402070" y="2443244"/>
+              <a:ext cx="1058303" cy="461665"/>
+            </a:xfrm>
+            <a:prstGeom prst="rect">
+              <a:avLst/>
+            </a:prstGeom>
+            <a:noFill/>
+          </p:spPr>
+          <p:txBody>
+            <a:bodyPr wrap="none" rtlCol="0">
+              <a:spAutoFit/>
+            </a:bodyPr>
+            <a:lstStyle/>
+            <a:p>
+              <a:r>
+                <a:rPr lang="en-US" altLang="ko-KR" sz="2400" dirty="0" smtClean="0">
+                  <a:ln>
+                    <a:solidFill>
+                      <a:schemeClr val="bg1">
+                        <a:alpha val="0"/>
+                      </a:schemeClr>
+                    </a:solidFill>
+                  </a:ln>
+                  <a:solidFill>
+                    <a:schemeClr val="tx1">
+                      <a:lumMod val="85000"/>
+                      <a:lumOff val="15000"/>
+                    </a:schemeClr>
+                  </a:solidFill>
+                  <a:latin typeface="Corbel" panose="020B0503020204020204" pitchFamily="34" charset="0"/>
+                  <a:ea typeface="맑은 고딕" panose="020B0503020000020004" pitchFamily="50" charset="-127"/>
+                </a:rPr>
+                <a:t>A.M.R.</a:t>
+              </a:r>
+              <a:endParaRPr lang="ko-KR" altLang="en-US" sz="2400" dirty="0">
+                <a:ln>
+                  <a:solidFill>
+                    <a:schemeClr val="bg1">
+                      <a:alpha val="0"/>
+                    </a:schemeClr>
+                  </a:solidFill>
+                </a:ln>
+                <a:solidFill>
+                  <a:schemeClr val="tx1">
+                    <a:lumMod val="85000"/>
+                    <a:lumOff val="15000"/>
+                  </a:schemeClr>
+                </a:solidFill>
+                <a:latin typeface="Corbel" panose="020B0503020204020204" pitchFamily="34" charset="0"/>
+                <a:ea typeface="맑은 고딕" panose="020B0503020000020004" pitchFamily="50" charset="-127"/>
+              </a:endParaRPr>
+            </a:p>
+          </p:txBody>
+        </p:sp>
+        <p:sp>
+          <p:nvSpPr>
+            <p:cNvPr id="12" name="TextBox 11"/>
+            <p:cNvSpPr txBox="1"/>
+            <p:nvPr/>
+          </p:nvSpPr>
+          <p:spPr>
+            <a:xfrm>
+              <a:off x="1342125" y="2123713"/>
+              <a:ext cx="1133644" cy="2215991"/>
+            </a:xfrm>
+            <a:prstGeom prst="rect">
+              <a:avLst/>
+            </a:prstGeom>
+            <a:noFill/>
+          </p:spPr>
+          <p:txBody>
+            <a:bodyPr wrap="none" rtlCol="0">
+              <a:spAutoFit/>
+            </a:bodyPr>
+            <a:lstStyle/>
+            <a:p>
+              <a:r>
+                <a:rPr lang="en-US" altLang="ko-KR" sz="13800" dirty="0">
+                  <a:ln>
+                    <a:solidFill>
+                      <a:schemeClr val="bg1">
+                        <a:alpha val="0"/>
+                      </a:schemeClr>
+                    </a:solidFill>
+                  </a:ln>
+                  <a:solidFill>
+                    <a:schemeClr val="tx1">
+                      <a:lumMod val="75000"/>
+                      <a:lumOff val="25000"/>
+                    </a:schemeClr>
+                  </a:solidFill>
+                  <a:latin typeface="Impact" pitchFamily="34" charset="0"/>
+                  <a:ea typeface="-윤고딕350" pitchFamily="18" charset="-127"/>
+                </a:rPr>
+                <a:t>5</a:t>
+              </a:r>
+              <a:endParaRPr lang="ko-KR" altLang="en-US" sz="13800" dirty="0">
+                <a:ln>
+                  <a:solidFill>
+                    <a:schemeClr val="bg1">
+                      <a:alpha val="0"/>
+                    </a:schemeClr>
+                  </a:solidFill>
+                </a:ln>
+                <a:solidFill>
+                  <a:schemeClr val="tx1">
+                    <a:lumMod val="75000"/>
+                    <a:lumOff val="25000"/>
+                  </a:schemeClr>
+                </a:solidFill>
+                <a:latin typeface="Impact" pitchFamily="34" charset="0"/>
+                <a:ea typeface="-윤고딕350" pitchFamily="18" charset="-127"/>
+              </a:endParaRPr>
+            </a:p>
+          </p:txBody>
+        </p:sp>
+      </p:grpSp>
+      <p:sp>
+        <p:nvSpPr>
+          <p:cNvPr id="9" name="직사각형 8"/>
+          <p:cNvSpPr/>
+          <p:nvPr/>
+        </p:nvSpPr>
+        <p:spPr>
+          <a:xfrm>
+            <a:off x="-64" y="6624736"/>
+            <a:ext cx="9144000" cy="260648"/>
+          </a:xfrm>
+          <a:prstGeom prst="rect">
+            <a:avLst/>
+          </a:prstGeom>
+          <a:solidFill>
+            <a:schemeClr val="tx1">
+              <a:lumMod val="75000"/>
+              <a:lumOff val="25000"/>
+            </a:schemeClr>
+          </a:solidFill>
+          <a:ln>
+            <a:solidFill>
+              <a:schemeClr val="tx1">
+                <a:lumMod val="75000"/>
+                <a:lumOff val="25000"/>
+              </a:schemeClr>
+            </a:solidFill>
+          </a:ln>
+        </p:spPr>
+        <p:style>
+          <a:lnRef idx="2">
+            <a:schemeClr val="accent1">
+              <a:shade val="50000"/>
+            </a:schemeClr>
+          </a:lnRef>
+          <a:fillRef idx="1">
+            <a:schemeClr val="accent1"/>
+          </a:fillRef>
+          <a:effectRef idx="0">
+            <a:schemeClr val="accent1"/>
+          </a:effectRef>
+          <a:fontRef idx="minor">
+            <a:schemeClr val="lt1"/>
+          </a:fontRef>
+        </p:style>
+        <p:txBody>
+          <a:bodyPr rot="0" spcFirstLastPara="0" vert="horz" wrap="square" lIns="91440" tIns="45720" rIns="91440" bIns="45720" numCol="1" spcCol="0" rtlCol="0" fromWordArt="0" anchor="ctr" anchorCtr="0" forceAA="0" compatLnSpc="1">
+            <a:prstTxWarp prst="textNoShape">
+              <a:avLst/>
+            </a:prstTxWarp>
+            <a:noAutofit/>
+          </a:bodyPr>
+          <a:lstStyle>
+            <a:defPPr>
+              <a:defRPr lang="ko-KR"/>
+            </a:defPPr>
+            <a:lvl1pPr marL="0" algn="l" defTabSz="914400" rtl="0" eaLnBrk="1" latinLnBrk="1" hangingPunct="1">
+              <a:defRPr sz="1800" kern="1200">
+                <a:solidFill>
+                  <a:schemeClr val="lt1"/>
+                </a:solidFill>
+                <a:latin typeface="+mn-lt"/>
+                <a:ea typeface="+mn-ea"/>
+                <a:cs typeface="+mn-cs"/>
+              </a:defRPr>
+            </a:lvl1pPr>
+            <a:lvl2pPr marL="457200" algn="l" defTabSz="914400" rtl="0" eaLnBrk="1" latinLnBrk="1" hangingPunct="1">
+              <a:defRPr sz="1800" kern="1200">
+                <a:solidFill>
+                  <a:schemeClr val="lt1"/>
+                </a:solidFill>
+                <a:latin typeface="+mn-lt"/>
+                <a:ea typeface="+mn-ea"/>
+                <a:cs typeface="+mn-cs"/>
+              </a:defRPr>
+            </a:lvl2pPr>
+            <a:lvl3pPr marL="914400" algn="l" defTabSz="914400" rtl="0" eaLnBrk="1" latinLnBrk="1" hangingPunct="1">
+              <a:defRPr sz="1800" kern="1200">
+                <a:solidFill>
+                  <a:schemeClr val="lt1"/>
+                </a:solidFill>
+                <a:latin typeface="+mn-lt"/>
+                <a:ea typeface="+mn-ea"/>
+                <a:cs typeface="+mn-cs"/>
+              </a:defRPr>
+            </a:lvl3pPr>
+            <a:lvl4pPr marL="1371600" algn="l" defTabSz="914400" rtl="0" eaLnBrk="1" latinLnBrk="1" hangingPunct="1">
+              <a:defRPr sz="1800" kern="1200">
+                <a:solidFill>
+                  <a:schemeClr val="lt1"/>
+                </a:solidFill>
+                <a:latin typeface="+mn-lt"/>
+                <a:ea typeface="+mn-ea"/>
+                <a:cs typeface="+mn-cs"/>
+              </a:defRPr>
+            </a:lvl4pPr>
+            <a:lvl5pPr marL="1828800" algn="l" defTabSz="914400" rtl="0" eaLnBrk="1" latinLnBrk="1" hangingPunct="1">
+              <a:defRPr sz="1800" kern="1200">
+                <a:solidFill>
+                  <a:schemeClr val="lt1"/>
+                </a:solidFill>
+                <a:latin typeface="+mn-lt"/>
+                <a:ea typeface="+mn-ea"/>
+                <a:cs typeface="+mn-cs"/>
+              </a:defRPr>
+            </a:lvl5pPr>
+            <a:lvl6pPr marL="2286000" algn="l" defTabSz="914400" rtl="0" eaLnBrk="1" latinLnBrk="1" hangingPunct="1">
+              <a:defRPr sz="1800" kern="1200">
+                <a:solidFill>
+                  <a:schemeClr val="lt1"/>
+                </a:solidFill>
+                <a:latin typeface="+mn-lt"/>
+                <a:ea typeface="+mn-ea"/>
+                <a:cs typeface="+mn-cs"/>
+              </a:defRPr>
+            </a:lvl6pPr>
+            <a:lvl7pPr marL="2743200" algn="l" defTabSz="914400" rtl="0" eaLnBrk="1" latinLnBrk="1" hangingPunct="1">
+              <a:defRPr sz="1800" kern="1200">
+                <a:solidFill>
+                  <a:schemeClr val="lt1"/>
+                </a:solidFill>
+                <a:latin typeface="+mn-lt"/>
+                <a:ea typeface="+mn-ea"/>
+                <a:cs typeface="+mn-cs"/>
+              </a:defRPr>
+            </a:lvl7pPr>
+            <a:lvl8pPr marL="3200400" algn="l" defTabSz="914400" rtl="0" eaLnBrk="1" latinLnBrk="1" hangingPunct="1">
+              <a:defRPr sz="1800" kern="1200">
+                <a:solidFill>
+                  <a:schemeClr val="lt1"/>
+                </a:solidFill>
+                <a:latin typeface="+mn-lt"/>
+                <a:ea typeface="+mn-ea"/>
+                <a:cs typeface="+mn-cs"/>
+              </a:defRPr>
+            </a:lvl8pPr>
+            <a:lvl9pPr marL="3657600" algn="l" defTabSz="914400" rtl="0" eaLnBrk="1" latinLnBrk="1" hangingPunct="1">
+              <a:defRPr sz="1800" kern="1200">
+                <a:solidFill>
+                  <a:schemeClr val="lt1"/>
+                </a:solidFill>
+                <a:latin typeface="+mn-lt"/>
+                <a:ea typeface="+mn-ea"/>
+                <a:cs typeface="+mn-cs"/>
+              </a:defRPr>
+            </a:lvl9pPr>
+          </a:lstStyle>
+          <a:p>
+            <a:pPr algn="ctr"/>
+            <a:endParaRPr lang="ko-KR" altLang="en-US"/>
+          </a:p>
+        </p:txBody>
+      </p:sp>
+      <p:sp>
+        <p:nvSpPr>
+          <p:cNvPr id="3" name="슬라이드 번호 개체 틀 2"/>
+          <p:cNvSpPr>
+            <a:spLocks noGrp="1"/>
+          </p:cNvSpPr>
+          <p:nvPr>
+            <p:ph type="sldNum" sz="quarter" idx="12"/>
+          </p:nvPr>
+        </p:nvSpPr>
+        <p:spPr/>
+        <p:txBody>
+          <a:bodyPr/>
+          <a:lstStyle/>
+          <a:p>
+            <a:fld id="{D6841A54-BA9E-43E7-A209-C0E692E2DAAC}" type="slidenum">
+              <a:rPr lang="ko-KR" altLang="en-US" smtClean="0"/>
+              <a:t>23</a:t>
+            </a:fld>
+            <a:endParaRPr lang="ko-KR" altLang="en-US"/>
+          </a:p>
+        </p:txBody>
+      </p:sp>
+    </p:spTree>
+    <p:extLst>
+      <p:ext uri="{BB962C8B-B14F-4D97-AF65-F5344CB8AC3E}">
+        <p14:creationId xmlns:p14="http://schemas.microsoft.com/office/powerpoint/2010/main" val="992091126"/>
+      </p:ext>
+    </p:extLst>
+  </p:cSld>
+  <p:clrMapOvr>
+    <a:masterClrMapping/>
+  </p:clrMapOvr>
+  <mc:AlternateContent xmlns:mc="http://schemas.openxmlformats.org/markup-compatibility/2006" xmlns:p14="http://schemas.microsoft.com/office/powerpoint/2010/main">
+    <mc:Choice Requires="p14">
+      <p:transition p14:dur="0"/>
+    </mc:Choice>
+    <mc:Fallback xmlns="">
+      <p:transition/>
+    </mc:Fallback>
+  </mc:AlternateContent>
+  <p:timing>
+    <p:tnLst>
+      <p:par>
+        <p:cTn id="1" dur="indefinite" restart="never" nodeType="tmRoot"/>
+      </p:par>
+    </p:tnLst>
+  </p:timing>
+</p:sld>
+</file>
+
+<file path=ppt/slides/slide24.xml><?xml version="1.0" encoding="utf-8"?>
+<p:sld xmlns:a="http://schemas.openxmlformats.org/drawingml/2006/main" xmlns:r="http://schemas.openxmlformats.org/officeDocument/2006/relationships" xmlns:p="http://schemas.openxmlformats.org/presentationml/2006/main">
+  <p:cSld>
+    <p:bg>
+      <p:bgPr>
+        <a:solidFill>
+          <a:schemeClr val="bg1"/>
+        </a:solidFill>
+        <a:effectLst/>
+      </p:bgPr>
+    </p:bg>
+    <p:spTree>
+      <p:nvGrpSpPr>
+        <p:cNvPr id="1" name=""/>
+        <p:cNvGrpSpPr/>
+        <p:nvPr/>
+      </p:nvGrpSpPr>
+      <p:grpSpPr>
+        <a:xfrm>
+          <a:off x="0" y="0"/>
+          <a:ext cx="0" cy="0"/>
+          <a:chOff x="0" y="0"/>
+          <a:chExt cx="0" cy="0"/>
+        </a:xfrm>
+      </p:grpSpPr>
       <p:sp>
         <p:nvSpPr>
           <p:cNvPr id="8" name="한쪽 모서리가 둥근 사각형 7"/>
@@ -21134,6 +21557,82 @@
       </p:grpSp>
       <p:sp>
         <p:nvSpPr>
+          <p:cNvPr id="10" name="TextBox 9"/>
+          <p:cNvSpPr txBox="1"/>
+          <p:nvPr/>
+        </p:nvSpPr>
+        <p:spPr>
+          <a:xfrm>
+            <a:off x="277702" y="384919"/>
+            <a:ext cx="996748" cy="307777"/>
+          </a:xfrm>
+          <a:prstGeom prst="rect">
+            <a:avLst/>
+          </a:prstGeom>
+          <a:noFill/>
+        </p:spPr>
+        <p:txBody>
+          <a:bodyPr wrap="none" rtlCol="0">
+            <a:spAutoFit/>
+          </a:bodyPr>
+          <a:lstStyle/>
+          <a:p>
+            <a:r>
+              <a:rPr lang="en-US" altLang="ko-KR" sz="1400" dirty="0" smtClean="0">
+                <a:ln>
+                  <a:solidFill>
+                    <a:schemeClr val="bg1">
+                      <a:alpha val="0"/>
+                    </a:schemeClr>
+                  </a:solidFill>
+                </a:ln>
+                <a:solidFill>
+                  <a:schemeClr val="tx1">
+                    <a:lumMod val="75000"/>
+                    <a:lumOff val="25000"/>
+                  </a:schemeClr>
+                </a:solidFill>
+                <a:latin typeface="Impact" panose="020B0806030902050204" pitchFamily="34" charset="0"/>
+                <a:ea typeface="맑은 고딕" panose="020B0503020000020004" pitchFamily="50" charset="-127"/>
+              </a:rPr>
+              <a:t>05</a:t>
+            </a:r>
+            <a:r>
+              <a:rPr lang="en-US" altLang="ko-KR" sz="1400" dirty="0" smtClean="0">
+                <a:ln>
+                  <a:solidFill>
+                    <a:schemeClr val="bg1">
+                      <a:alpha val="0"/>
+                    </a:schemeClr>
+                  </a:solidFill>
+                </a:ln>
+                <a:solidFill>
+                  <a:schemeClr val="bg1"/>
+                </a:solidFill>
+                <a:latin typeface="맑은 고딕" panose="020B0503020000020004" pitchFamily="50" charset="-127"/>
+                <a:ea typeface="맑은 고딕" panose="020B0503020000020004" pitchFamily="50" charset="-127"/>
+              </a:rPr>
+              <a:t>  TODO</a:t>
+            </a:r>
+            <a:endParaRPr lang="ko-KR" altLang="en-US" sz="1400" dirty="0">
+              <a:ln>
+                <a:solidFill>
+                  <a:schemeClr val="bg1">
+                    <a:alpha val="0"/>
+                  </a:schemeClr>
+                </a:solidFill>
+              </a:ln>
+              <a:solidFill>
+                <a:schemeClr val="bg1"/>
+              </a:solidFill>
+              <a:latin typeface="맑은 고딕" panose="020B0503020000020004" pitchFamily="50" charset="-127"/>
+              <a:ea typeface="맑은 고딕" panose="020B0503020000020004" pitchFamily="50" charset="-127"/>
+            </a:endParaRPr>
+          </a:p>
+        </p:txBody>
+      </p:sp>
+      <p:sp>
+        <p:nvSpPr>
           <p:cNvPr id="19" name="한쪽 모서리가 둥근 사각형 18"/>
           <p:cNvSpPr/>
           <p:nvPr/>
@@ -21407,196 +21906,16 @@
       </p:sp>
       <p:sp>
         <p:nvSpPr>
-          <p:cNvPr id="17" name="TextBox 16"/>
-          <p:cNvSpPr txBox="1"/>
+          <p:cNvPr id="2" name="직사각형 1"/>
+          <p:cNvSpPr/>
           <p:nvPr/>
         </p:nvSpPr>
         <p:spPr>
           <a:xfrm>
-            <a:off x="277702" y="384919"/>
-            <a:ext cx="1021433" cy="307777"/>
+            <a:off x="560800" y="1052736"/>
+            <a:ext cx="122768" cy="3960440"/>
           </a:xfrm>
           <a:prstGeom prst="rect">
-            <a:avLst/>
-          </a:prstGeom>
-          <a:noFill/>
-        </p:spPr>
-        <p:txBody>
-          <a:bodyPr wrap="none" rtlCol="0">
-            <a:spAutoFit/>
-          </a:bodyPr>
-          <a:lstStyle/>
-          <a:p>
-            <a:r>
-              <a:rPr lang="en-US" altLang="ko-KR" sz="1400" dirty="0" smtClean="0">
-                <a:ln>
-                  <a:solidFill>
-                    <a:schemeClr val="bg1">
-                      <a:alpha val="0"/>
-                    </a:schemeClr>
-                  </a:solidFill>
-                </a:ln>
-                <a:solidFill>
-                  <a:schemeClr val="tx1">
-                    <a:lumMod val="75000"/>
-                    <a:lumOff val="25000"/>
-                  </a:schemeClr>
-                </a:solidFill>
-                <a:latin typeface="Impact" panose="020B0806030902050204" pitchFamily="34" charset="0"/>
-                <a:ea typeface="맑은 고딕" panose="020B0503020000020004" pitchFamily="50" charset="-127"/>
-              </a:rPr>
-              <a:t>04</a:t>
-            </a:r>
-            <a:r>
-              <a:rPr lang="en-US" altLang="ko-KR" sz="1400" dirty="0" smtClean="0">
-                <a:ln>
-                  <a:solidFill>
-                    <a:schemeClr val="bg1">
-                      <a:alpha val="0"/>
-                    </a:schemeClr>
-                  </a:solidFill>
-                </a:ln>
-                <a:solidFill>
-                  <a:schemeClr val="bg1"/>
-                </a:solidFill>
-                <a:latin typeface="맑은 고딕" panose="020B0503020000020004" pitchFamily="50" charset="-127"/>
-                <a:ea typeface="맑은 고딕" panose="020B0503020000020004" pitchFamily="50" charset="-127"/>
-              </a:rPr>
-              <a:t>  DEMO</a:t>
-            </a:r>
-            <a:endParaRPr lang="ko-KR" altLang="en-US" sz="1400" dirty="0">
-              <a:ln>
-                <a:solidFill>
-                  <a:schemeClr val="bg1">
-                    <a:alpha val="0"/>
-                  </a:schemeClr>
-                </a:solidFill>
-              </a:ln>
-              <a:solidFill>
-                <a:schemeClr val="bg1"/>
-              </a:solidFill>
-              <a:latin typeface="맑은 고딕" panose="020B0503020000020004" pitchFamily="50" charset="-127"/>
-              <a:ea typeface="맑은 고딕" panose="020B0503020000020004" pitchFamily="50" charset="-127"/>
-            </a:endParaRPr>
-          </a:p>
-        </p:txBody>
-      </p:sp>
-      <p:sp>
-        <p:nvSpPr>
-          <p:cNvPr id="5" name="슬라이드 번호 개체 틀 4"/>
-          <p:cNvSpPr>
-            <a:spLocks noGrp="1"/>
-          </p:cNvSpPr>
-          <p:nvPr>
-            <p:ph type="sldNum" sz="quarter" idx="12"/>
-          </p:nvPr>
-        </p:nvSpPr>
-        <p:spPr/>
-        <p:txBody>
-          <a:bodyPr/>
-          <a:lstStyle/>
-          <a:p>
-            <a:fld id="{D6841A54-BA9E-43E7-A209-C0E692E2DAAC}" type="slidenum">
-              <a:rPr lang="ko-KR" altLang="en-US" smtClean="0"/>
-              <a:t>23</a:t>
-            </a:fld>
-            <a:endParaRPr lang="ko-KR" altLang="en-US" dirty="0"/>
-          </a:p>
-        </p:txBody>
-      </p:sp>
-    </p:spTree>
-    <p:extLst>
-      <p:ext uri="{BB962C8B-B14F-4D97-AF65-F5344CB8AC3E}">
-        <p14:creationId xmlns:p14="http://schemas.microsoft.com/office/powerpoint/2010/main" val="4194585198"/>
-      </p:ext>
-    </p:extLst>
-  </p:cSld>
-  <p:clrMapOvr>
-    <a:masterClrMapping/>
-  </p:clrMapOvr>
-  <mc:AlternateContent xmlns:mc="http://schemas.openxmlformats.org/markup-compatibility/2006" xmlns:p14="http://schemas.microsoft.com/office/powerpoint/2010/main">
-    <mc:Choice Requires="p14">
-      <p:transition p14:dur="0"/>
-    </mc:Choice>
-    <mc:Fallback xmlns="">
-      <p:transition/>
-    </mc:Fallback>
-  </mc:AlternateContent>
-  <p:timing>
-    <p:tnLst>
-      <p:par>
-        <p:cTn id="1" dur="indefinite" restart="never" nodeType="tmRoot"/>
-      </p:par>
-    </p:tnLst>
-  </p:timing>
-</p:sld>
-</file>
-
-<file path=ppt/slides/slide24.xml><?xml version="1.0" encoding="utf-8"?>
-<p:sld xmlns:a="http://schemas.openxmlformats.org/drawingml/2006/main" xmlns:r="http://schemas.openxmlformats.org/officeDocument/2006/relationships" xmlns:p="http://schemas.openxmlformats.org/presentationml/2006/main">
-  <p:cSld>
-    <p:spTree>
-      <p:nvGrpSpPr>
-        <p:cNvPr id="1" name=""/>
-        <p:cNvGrpSpPr/>
-        <p:nvPr/>
-      </p:nvGrpSpPr>
-      <p:grpSpPr>
-        <a:xfrm>
-          <a:off x="0" y="0"/>
-          <a:ext cx="0" cy="0"/>
-          <a:chOff x="0" y="0"/>
-          <a:chExt cx="0" cy="0"/>
-        </a:xfrm>
-      </p:grpSpPr>
-      <p:pic>
-        <p:nvPicPr>
-          <p:cNvPr id="4" name="그림 3"/>
-          <p:cNvPicPr>
-            <a:picLocks noChangeAspect="1"/>
-          </p:cNvPicPr>
-          <p:nvPr/>
-        </p:nvPicPr>
-        <p:blipFill rotWithShape="1">
-          <a:blip r:embed="rId2">
-            <a:duotone>
-              <a:prstClr val="black"/>
-              <a:srgbClr val="D9C3A5">
-                <a:tint val="50000"/>
-                <a:satMod val="180000"/>
-              </a:srgbClr>
-            </a:duotone>
-            <a:extLst>
-              <a:ext uri="{28A0092B-C50C-407E-A947-70E740481C1C}">
-                <a14:useLocalDpi xmlns:a14="http://schemas.microsoft.com/office/drawing/2010/main" val="0"/>
-              </a:ext>
-            </a:extLst>
-          </a:blip>
-          <a:srcRect l="16739" t="18519" b="42592"/>
-          <a:stretch/>
-        </p:blipFill>
-        <p:spPr>
-          <a:xfrm>
-            <a:off x="0" y="2117452"/>
-            <a:ext cx="9136088" cy="2667000"/>
-          </a:xfrm>
-          <a:prstGeom prst="rect">
-            <a:avLst/>
-          </a:prstGeom>
-        </p:spPr>
-      </p:pic>
-      <p:sp>
-        <p:nvSpPr>
-          <p:cNvPr id="8" name="타원 7"/>
-          <p:cNvSpPr/>
-          <p:nvPr/>
-        </p:nvSpPr>
-        <p:spPr>
-          <a:xfrm>
-            <a:off x="683568" y="1412776"/>
-            <a:ext cx="4176464" cy="4176464"/>
-          </a:xfrm>
-          <a:prstGeom prst="ellipse">
             <a:avLst/>
           </a:prstGeom>
           <a:solidFill>
@@ -21633,357 +21952,9 @@
           </a:p>
         </p:txBody>
       </p:sp>
-      <p:grpSp>
-        <p:nvGrpSpPr>
-          <p:cNvPr id="13" name="그룹 12"/>
-          <p:cNvGrpSpPr/>
-          <p:nvPr/>
-        </p:nvGrpSpPr>
-        <p:grpSpPr>
-          <a:xfrm>
-            <a:off x="992808" y="2365137"/>
-            <a:ext cx="3149171" cy="2215991"/>
-            <a:chOff x="1342125" y="2123713"/>
-            <a:chExt cx="3149171" cy="2215991"/>
-          </a:xfrm>
-        </p:grpSpPr>
-        <p:sp>
-          <p:nvSpPr>
-            <p:cNvPr id="10" name="TextBox 9"/>
-            <p:cNvSpPr txBox="1"/>
-            <p:nvPr/>
-          </p:nvSpPr>
-          <p:spPr>
-            <a:xfrm>
-              <a:off x="2402070" y="3056371"/>
-              <a:ext cx="2089226" cy="923330"/>
-            </a:xfrm>
-            <a:prstGeom prst="rect">
-              <a:avLst/>
-            </a:prstGeom>
-            <a:noFill/>
-          </p:spPr>
-          <p:txBody>
-            <a:bodyPr wrap="none" rtlCol="0">
-              <a:spAutoFit/>
-            </a:bodyPr>
-            <a:lstStyle/>
-            <a:p>
-              <a:r>
-                <a:rPr lang="en-US" altLang="ko-KR" sz="5400" dirty="0" smtClean="0">
-                  <a:ln>
-                    <a:solidFill>
-                      <a:schemeClr val="bg1">
-                        <a:alpha val="0"/>
-                      </a:schemeClr>
-                    </a:solidFill>
-                  </a:ln>
-                  <a:solidFill>
-                    <a:srgbClr val="ADCC03"/>
-                  </a:solidFill>
-                  <a:latin typeface="맑은 고딕" panose="020B0503020000020004" pitchFamily="50" charset="-127"/>
-                  <a:ea typeface="맑은 고딕" panose="020B0503020000020004" pitchFamily="50" charset="-127"/>
-                </a:rPr>
-                <a:t>TODO</a:t>
-              </a:r>
-              <a:endParaRPr lang="ko-KR" altLang="en-US" sz="5400" dirty="0">
-                <a:ln>
-                  <a:solidFill>
-                    <a:schemeClr val="bg1">
-                      <a:alpha val="0"/>
-                    </a:schemeClr>
-                  </a:solidFill>
-                </a:ln>
-                <a:solidFill>
-                  <a:srgbClr val="ADCC03"/>
-                </a:solidFill>
-                <a:latin typeface="맑은 고딕" panose="020B0503020000020004" pitchFamily="50" charset="-127"/>
-                <a:ea typeface="맑은 고딕" panose="020B0503020000020004" pitchFamily="50" charset="-127"/>
-              </a:endParaRPr>
-            </a:p>
-          </p:txBody>
-        </p:sp>
-        <p:sp>
-          <p:nvSpPr>
-            <p:cNvPr id="11" name="TextBox 10"/>
-            <p:cNvSpPr txBox="1"/>
-            <p:nvPr/>
-          </p:nvSpPr>
-          <p:spPr>
-            <a:xfrm>
-              <a:off x="2402070" y="2443244"/>
-              <a:ext cx="1058303" cy="461665"/>
-            </a:xfrm>
-            <a:prstGeom prst="rect">
-              <a:avLst/>
-            </a:prstGeom>
-            <a:noFill/>
-          </p:spPr>
-          <p:txBody>
-            <a:bodyPr wrap="none" rtlCol="0">
-              <a:spAutoFit/>
-            </a:bodyPr>
-            <a:lstStyle/>
-            <a:p>
-              <a:r>
-                <a:rPr lang="en-US" altLang="ko-KR" sz="2400" dirty="0" smtClean="0">
-                  <a:ln>
-                    <a:solidFill>
-                      <a:schemeClr val="bg1">
-                        <a:alpha val="0"/>
-                      </a:schemeClr>
-                    </a:solidFill>
-                  </a:ln>
-                  <a:solidFill>
-                    <a:schemeClr val="tx1">
-                      <a:lumMod val="85000"/>
-                      <a:lumOff val="15000"/>
-                    </a:schemeClr>
-                  </a:solidFill>
-                  <a:latin typeface="Corbel" panose="020B0503020204020204" pitchFamily="34" charset="0"/>
-                  <a:ea typeface="맑은 고딕" panose="020B0503020000020004" pitchFamily="50" charset="-127"/>
-                </a:rPr>
-                <a:t>A.M.R.</a:t>
-              </a:r>
-              <a:endParaRPr lang="ko-KR" altLang="en-US" sz="2400" dirty="0">
-                <a:ln>
-                  <a:solidFill>
-                    <a:schemeClr val="bg1">
-                      <a:alpha val="0"/>
-                    </a:schemeClr>
-                  </a:solidFill>
-                </a:ln>
-                <a:solidFill>
-                  <a:schemeClr val="tx1">
-                    <a:lumMod val="85000"/>
-                    <a:lumOff val="15000"/>
-                  </a:schemeClr>
-                </a:solidFill>
-                <a:latin typeface="Corbel" panose="020B0503020204020204" pitchFamily="34" charset="0"/>
-                <a:ea typeface="맑은 고딕" panose="020B0503020000020004" pitchFamily="50" charset="-127"/>
-              </a:endParaRPr>
-            </a:p>
-          </p:txBody>
-        </p:sp>
-        <p:sp>
-          <p:nvSpPr>
-            <p:cNvPr id="12" name="TextBox 11"/>
-            <p:cNvSpPr txBox="1"/>
-            <p:nvPr/>
-          </p:nvSpPr>
-          <p:spPr>
-            <a:xfrm>
-              <a:off x="1342125" y="2123713"/>
-              <a:ext cx="1133644" cy="2215991"/>
-            </a:xfrm>
-            <a:prstGeom prst="rect">
-              <a:avLst/>
-            </a:prstGeom>
-            <a:noFill/>
-          </p:spPr>
-          <p:txBody>
-            <a:bodyPr wrap="none" rtlCol="0">
-              <a:spAutoFit/>
-            </a:bodyPr>
-            <a:lstStyle/>
-            <a:p>
-              <a:r>
-                <a:rPr lang="en-US" altLang="ko-KR" sz="13800" dirty="0">
-                  <a:ln>
-                    <a:solidFill>
-                      <a:schemeClr val="bg1">
-                        <a:alpha val="0"/>
-                      </a:schemeClr>
-                    </a:solidFill>
-                  </a:ln>
-                  <a:solidFill>
-                    <a:schemeClr val="tx1">
-                      <a:lumMod val="75000"/>
-                      <a:lumOff val="25000"/>
-                    </a:schemeClr>
-                  </a:solidFill>
-                  <a:latin typeface="Impact" pitchFamily="34" charset="0"/>
-                  <a:ea typeface="-윤고딕350" pitchFamily="18" charset="-127"/>
-                </a:rPr>
-                <a:t>5</a:t>
-              </a:r>
-              <a:endParaRPr lang="ko-KR" altLang="en-US" sz="13800" dirty="0">
-                <a:ln>
-                  <a:solidFill>
-                    <a:schemeClr val="bg1">
-                      <a:alpha val="0"/>
-                    </a:schemeClr>
-                  </a:solidFill>
-                </a:ln>
-                <a:solidFill>
-                  <a:schemeClr val="tx1">
-                    <a:lumMod val="75000"/>
-                    <a:lumOff val="25000"/>
-                  </a:schemeClr>
-                </a:solidFill>
-                <a:latin typeface="Impact" pitchFamily="34" charset="0"/>
-                <a:ea typeface="-윤고딕350" pitchFamily="18" charset="-127"/>
-              </a:endParaRPr>
-            </a:p>
-          </p:txBody>
-        </p:sp>
-      </p:grpSp>
-      <p:sp>
-        <p:nvSpPr>
-          <p:cNvPr id="9" name="직사각형 8"/>
-          <p:cNvSpPr/>
-          <p:nvPr/>
-        </p:nvSpPr>
-        <p:spPr>
-          <a:xfrm>
-            <a:off x="-64" y="6624736"/>
-            <a:ext cx="9144000" cy="260648"/>
-          </a:xfrm>
-          <a:prstGeom prst="rect">
-            <a:avLst/>
-          </a:prstGeom>
-          <a:solidFill>
-            <a:schemeClr val="tx1">
-              <a:lumMod val="75000"/>
-              <a:lumOff val="25000"/>
-            </a:schemeClr>
-          </a:solidFill>
-          <a:ln>
-            <a:solidFill>
-              <a:schemeClr val="tx1">
-                <a:lumMod val="75000"/>
-                <a:lumOff val="25000"/>
-              </a:schemeClr>
-            </a:solidFill>
-          </a:ln>
-        </p:spPr>
-        <p:style>
-          <a:lnRef idx="2">
-            <a:schemeClr val="accent1">
-              <a:shade val="50000"/>
-            </a:schemeClr>
-          </a:lnRef>
-          <a:fillRef idx="1">
-            <a:schemeClr val="accent1"/>
-          </a:fillRef>
-          <a:effectRef idx="0">
-            <a:schemeClr val="accent1"/>
-          </a:effectRef>
-          <a:fontRef idx="minor">
-            <a:schemeClr val="lt1"/>
-          </a:fontRef>
-        </p:style>
-        <p:txBody>
-          <a:bodyPr rot="0" spcFirstLastPara="0" vert="horz" wrap="square" lIns="91440" tIns="45720" rIns="91440" bIns="45720" numCol="1" spcCol="0" rtlCol="0" fromWordArt="0" anchor="ctr" anchorCtr="0" forceAA="0" compatLnSpc="1">
-            <a:prstTxWarp prst="textNoShape">
-              <a:avLst/>
-            </a:prstTxWarp>
-            <a:noAutofit/>
-          </a:bodyPr>
-          <a:lstStyle>
-            <a:defPPr>
-              <a:defRPr lang="ko-KR"/>
-            </a:defPPr>
-            <a:lvl1pPr marL="0" algn="l" defTabSz="914400" rtl="0" eaLnBrk="1" latinLnBrk="1" hangingPunct="1">
-              <a:defRPr sz="1800" kern="1200">
-                <a:solidFill>
-                  <a:schemeClr val="lt1"/>
-                </a:solidFill>
-                <a:latin typeface="+mn-lt"/>
-                <a:ea typeface="+mn-ea"/>
-                <a:cs typeface="+mn-cs"/>
-              </a:defRPr>
-            </a:lvl1pPr>
-            <a:lvl2pPr marL="457200" algn="l" defTabSz="914400" rtl="0" eaLnBrk="1" latinLnBrk="1" hangingPunct="1">
-              <a:defRPr sz="1800" kern="1200">
-                <a:solidFill>
-                  <a:schemeClr val="lt1"/>
-                </a:solidFill>
-                <a:latin typeface="+mn-lt"/>
-                <a:ea typeface="+mn-ea"/>
-                <a:cs typeface="+mn-cs"/>
-              </a:defRPr>
-            </a:lvl2pPr>
-            <a:lvl3pPr marL="914400" algn="l" defTabSz="914400" rtl="0" eaLnBrk="1" latinLnBrk="1" hangingPunct="1">
-              <a:defRPr sz="1800" kern="1200">
-                <a:solidFill>
-                  <a:schemeClr val="lt1"/>
-                </a:solidFill>
-                <a:latin typeface="+mn-lt"/>
-                <a:ea typeface="+mn-ea"/>
-                <a:cs typeface="+mn-cs"/>
-              </a:defRPr>
-            </a:lvl3pPr>
-            <a:lvl4pPr marL="1371600" algn="l" defTabSz="914400" rtl="0" eaLnBrk="1" latinLnBrk="1" hangingPunct="1">
-              <a:defRPr sz="1800" kern="1200">
-                <a:solidFill>
-                  <a:schemeClr val="lt1"/>
-                </a:solidFill>
-                <a:latin typeface="+mn-lt"/>
-                <a:ea typeface="+mn-ea"/>
-                <a:cs typeface="+mn-cs"/>
-              </a:defRPr>
-            </a:lvl4pPr>
-            <a:lvl5pPr marL="1828800" algn="l" defTabSz="914400" rtl="0" eaLnBrk="1" latinLnBrk="1" hangingPunct="1">
-              <a:defRPr sz="1800" kern="1200">
-                <a:solidFill>
-                  <a:schemeClr val="lt1"/>
-                </a:solidFill>
-                <a:latin typeface="+mn-lt"/>
-                <a:ea typeface="+mn-ea"/>
-                <a:cs typeface="+mn-cs"/>
-              </a:defRPr>
-            </a:lvl5pPr>
-            <a:lvl6pPr marL="2286000" algn="l" defTabSz="914400" rtl="0" eaLnBrk="1" latinLnBrk="1" hangingPunct="1">
-              <a:defRPr sz="1800" kern="1200">
-                <a:solidFill>
-                  <a:schemeClr val="lt1"/>
-                </a:solidFill>
-                <a:latin typeface="+mn-lt"/>
-                <a:ea typeface="+mn-ea"/>
-                <a:cs typeface="+mn-cs"/>
-              </a:defRPr>
-            </a:lvl6pPr>
-            <a:lvl7pPr marL="2743200" algn="l" defTabSz="914400" rtl="0" eaLnBrk="1" latinLnBrk="1" hangingPunct="1">
-              <a:defRPr sz="1800" kern="1200">
-                <a:solidFill>
-                  <a:schemeClr val="lt1"/>
-                </a:solidFill>
-                <a:latin typeface="+mn-lt"/>
-                <a:ea typeface="+mn-ea"/>
-                <a:cs typeface="+mn-cs"/>
-              </a:defRPr>
-            </a:lvl7pPr>
-            <a:lvl8pPr marL="3200400" algn="l" defTabSz="914400" rtl="0" eaLnBrk="1" latinLnBrk="1" hangingPunct="1">
-              <a:defRPr sz="1800" kern="1200">
-                <a:solidFill>
-                  <a:schemeClr val="lt1"/>
-                </a:solidFill>
-                <a:latin typeface="+mn-lt"/>
-                <a:ea typeface="+mn-ea"/>
-                <a:cs typeface="+mn-cs"/>
-              </a:defRPr>
-            </a:lvl8pPr>
-            <a:lvl9pPr marL="3657600" algn="l" defTabSz="914400" rtl="0" eaLnBrk="1" latinLnBrk="1" hangingPunct="1">
-              <a:defRPr sz="1800" kern="1200">
-                <a:solidFill>
-                  <a:schemeClr val="lt1"/>
-                </a:solidFill>
-                <a:latin typeface="+mn-lt"/>
-                <a:ea typeface="+mn-ea"/>
-                <a:cs typeface="+mn-cs"/>
-              </a:defRPr>
-            </a:lvl9pPr>
-          </a:lstStyle>
-          <a:p>
-            <a:pPr algn="ctr"/>
-            <a:endParaRPr lang="ko-KR" altLang="en-US"/>
-          </a:p>
-        </p:txBody>
-      </p:sp>
-      <p:sp>
-        <p:nvSpPr>
-          <p:cNvPr id="3" name="슬라이드 번호 개체 틀 2"/>
+      <p:sp>
+        <p:nvSpPr>
+          <p:cNvPr id="6" name="슬라이드 번호 개체 틀 5"/>
           <p:cNvSpPr>
             <a:spLocks noGrp="1"/>
           </p:cNvSpPr>
@@ -22000,14 +21971,355 @@
               <a:rPr lang="ko-KR" altLang="en-US" smtClean="0"/>
               <a:t>24</a:t>
             </a:fld>
-            <a:endParaRPr lang="ko-KR" altLang="en-US"/>
+            <a:endParaRPr lang="ko-KR" altLang="en-US" dirty="0"/>
+          </a:p>
+        </p:txBody>
+      </p:sp>
+      <p:sp>
+        <p:nvSpPr>
+          <p:cNvPr id="13" name="TextBox 12"/>
+          <p:cNvSpPr txBox="1"/>
+          <p:nvPr/>
+        </p:nvSpPr>
+        <p:spPr>
+          <a:xfrm>
+            <a:off x="899592" y="956232"/>
+            <a:ext cx="5544616" cy="4585871"/>
+          </a:xfrm>
+          <a:prstGeom prst="rect">
+            <a:avLst/>
+          </a:prstGeom>
+          <a:noFill/>
+        </p:spPr>
+        <p:txBody>
+          <a:bodyPr wrap="square" rtlCol="0">
+            <a:spAutoFit/>
+          </a:bodyPr>
+          <a:lstStyle/>
+          <a:p>
+            <a:r>
+              <a:rPr lang="en-US" altLang="ko-KR" sz="4000" dirty="0" smtClean="0"/>
+              <a:t>Formant Analysis</a:t>
+            </a:r>
+          </a:p>
+          <a:p>
+            <a:pPr marL="285750" indent="-285750">
+              <a:buFont typeface="Arial" panose="020B0604020202020204" pitchFamily="34" charset="0"/>
+              <a:buChar char="•"/>
+            </a:pPr>
+            <a:endParaRPr lang="en-US" altLang="ko-KR" dirty="0" smtClean="0"/>
+          </a:p>
+          <a:p>
+            <a:pPr marL="285750" indent="-285750">
+              <a:buFont typeface="Arial" panose="020B0604020202020204" pitchFamily="34" charset="0"/>
+              <a:buChar char="•"/>
+            </a:pPr>
+            <a:r>
+              <a:rPr lang="ko-KR" altLang="en-US" dirty="0" smtClean="0"/>
+              <a:t>사람의 음성을 인식할 수 있는 것은 여러 가지 요소들이 있으나 그 대표적인 것이 바로 </a:t>
+            </a:r>
+            <a:r>
+              <a:rPr lang="en-US" altLang="ko-KR" dirty="0" smtClean="0"/>
+              <a:t>formant</a:t>
+            </a:r>
+            <a:r>
+              <a:rPr lang="ko-KR" altLang="en-US" dirty="0" smtClean="0"/>
+              <a:t>임</a:t>
+            </a:r>
+            <a:r>
+              <a:rPr lang="en-US" altLang="ko-KR" dirty="0" smtClean="0"/>
+              <a:t>.</a:t>
+            </a:r>
+          </a:p>
+          <a:p>
+            <a:pPr marL="285750" indent="-285750">
+              <a:buFont typeface="Arial" panose="020B0604020202020204" pitchFamily="34" charset="0"/>
+              <a:buChar char="•"/>
+            </a:pPr>
+            <a:endParaRPr lang="en-US" altLang="ko-KR" dirty="0" smtClean="0"/>
+          </a:p>
+          <a:p>
+            <a:pPr marL="285750" indent="-285750">
+              <a:buFont typeface="Arial" panose="020B0604020202020204" pitchFamily="34" charset="0"/>
+              <a:buChar char="•"/>
+            </a:pPr>
+            <a:r>
+              <a:rPr lang="en-US" altLang="ko-KR" dirty="0" smtClean="0"/>
+              <a:t>formant </a:t>
+            </a:r>
+            <a:r>
+              <a:rPr lang="ko-KR" altLang="en-US" dirty="0" smtClean="0"/>
+              <a:t>정보는 모음에 따라 사람마다 조금씩 다 다르면서도</a:t>
+            </a:r>
+            <a:r>
+              <a:rPr lang="en-US" altLang="ko-KR" dirty="0" smtClean="0"/>
+              <a:t>, </a:t>
+            </a:r>
+            <a:r>
+              <a:rPr lang="ko-KR" altLang="en-US" dirty="0" smtClean="0"/>
+              <a:t>어느 정도 동일한 대역의 값을 가지고 있다</a:t>
+            </a:r>
+            <a:r>
+              <a:rPr lang="en-US" altLang="ko-KR" dirty="0" smtClean="0"/>
+              <a:t>.</a:t>
+            </a:r>
+          </a:p>
+          <a:p>
+            <a:pPr marL="285750" indent="-285750">
+              <a:buFont typeface="Arial" panose="020B0604020202020204" pitchFamily="34" charset="0"/>
+              <a:buChar char="•"/>
+            </a:pPr>
+            <a:endParaRPr lang="en-US" altLang="ko-KR" dirty="0" smtClean="0"/>
+          </a:p>
+          <a:p>
+            <a:pPr marL="285750" indent="-285750">
+              <a:buFont typeface="Arial" panose="020B0604020202020204" pitchFamily="34" charset="0"/>
+              <a:buChar char="•"/>
+            </a:pPr>
+            <a:r>
+              <a:rPr lang="ko-KR" altLang="en-US" dirty="0" smtClean="0"/>
+              <a:t>대부분의 논문이나 자료는 외국인</a:t>
+            </a:r>
+            <a:r>
+              <a:rPr lang="en-US" altLang="ko-KR" dirty="0" smtClean="0"/>
+              <a:t>(</a:t>
+            </a:r>
+            <a:r>
+              <a:rPr lang="ko-KR" altLang="en-US" dirty="0" smtClean="0"/>
+              <a:t>미국인</a:t>
+            </a:r>
+            <a:r>
+              <a:rPr lang="en-US" altLang="ko-KR" dirty="0" smtClean="0"/>
+              <a:t>)</a:t>
+            </a:r>
+            <a:r>
+              <a:rPr lang="ko-KR" altLang="en-US" dirty="0" smtClean="0"/>
+              <a:t>의 모음</a:t>
+            </a:r>
+            <a:r>
+              <a:rPr lang="en-US" altLang="ko-KR" dirty="0" smtClean="0"/>
+              <a:t>(AEIOU)</a:t>
+            </a:r>
+            <a:r>
+              <a:rPr lang="ko-KR" altLang="en-US" dirty="0" smtClean="0"/>
+              <a:t>에 대한 분석이 주를 이루고 있다</a:t>
+            </a:r>
+            <a:r>
+              <a:rPr lang="en-US" altLang="ko-KR" dirty="0" smtClean="0"/>
+              <a:t>.</a:t>
+            </a:r>
+          </a:p>
+          <a:p>
+            <a:pPr marL="285750" indent="-285750">
+              <a:buFont typeface="Arial" panose="020B0604020202020204" pitchFamily="34" charset="0"/>
+              <a:buChar char="•"/>
+            </a:pPr>
+            <a:endParaRPr lang="en-US" altLang="ko-KR" dirty="0" smtClean="0"/>
+          </a:p>
+          <a:p>
+            <a:pPr marL="285750" indent="-285750">
+              <a:buFont typeface="Arial" panose="020B0604020202020204" pitchFamily="34" charset="0"/>
+              <a:buChar char="•"/>
+            </a:pPr>
+            <a:r>
+              <a:rPr lang="ko-KR" altLang="en-US" dirty="0" smtClean="0"/>
+              <a:t>한국어의 경우 </a:t>
+            </a:r>
+            <a:r>
+              <a:rPr lang="en-US" altLang="ko-KR" dirty="0" smtClean="0"/>
+              <a:t>“</a:t>
+            </a:r>
+            <a:r>
+              <a:rPr lang="ko-KR" altLang="en-US" dirty="0" err="1" smtClean="0"/>
+              <a:t>ㅏ</a:t>
+            </a:r>
+            <a:r>
+              <a:rPr lang="en-US" altLang="ko-KR" dirty="0" smtClean="0"/>
+              <a:t>, </a:t>
+            </a:r>
+            <a:r>
+              <a:rPr lang="ko-KR" altLang="en-US" dirty="0" err="1" smtClean="0"/>
+              <a:t>ㅔ</a:t>
+            </a:r>
+            <a:r>
+              <a:rPr lang="en-US" altLang="ko-KR" dirty="0" smtClean="0"/>
+              <a:t>, </a:t>
+            </a:r>
+            <a:r>
+              <a:rPr lang="ko-KR" altLang="en-US" dirty="0" err="1" smtClean="0"/>
+              <a:t>ㅣ</a:t>
+            </a:r>
+            <a:r>
+              <a:rPr lang="en-US" altLang="ko-KR" dirty="0" smtClean="0"/>
+              <a:t>, </a:t>
+            </a:r>
+            <a:r>
+              <a:rPr lang="ko-KR" altLang="en-US" dirty="0" err="1" smtClean="0"/>
+              <a:t>ㅗ</a:t>
+            </a:r>
+            <a:r>
+              <a:rPr lang="en-US" altLang="ko-KR" dirty="0" smtClean="0"/>
+              <a:t>, </a:t>
+            </a:r>
+            <a:r>
+              <a:rPr lang="ko-KR" altLang="en-US" dirty="0" err="1" smtClean="0"/>
+              <a:t>ㅜ</a:t>
+            </a:r>
+            <a:r>
+              <a:rPr lang="en-US" altLang="ko-KR" dirty="0" smtClean="0"/>
+              <a:t>”</a:t>
+            </a:r>
+            <a:r>
+              <a:rPr lang="ko-KR" altLang="en-US" dirty="0" smtClean="0"/>
+              <a:t> 뿐만 아니라 종성</a:t>
+            </a:r>
+            <a:r>
+              <a:rPr lang="en-US" altLang="ko-KR" dirty="0" smtClean="0"/>
+              <a:t>(“</a:t>
+            </a:r>
+            <a:r>
+              <a:rPr lang="ko-KR" altLang="en-US" dirty="0" smtClean="0"/>
+              <a:t>ㄴ</a:t>
+            </a:r>
+            <a:r>
+              <a:rPr lang="en-US" altLang="ko-KR" dirty="0" smtClean="0"/>
+              <a:t>, </a:t>
+            </a:r>
+            <a:r>
+              <a:rPr lang="ko-KR" altLang="en-US" dirty="0" smtClean="0"/>
+              <a:t>ㄹ</a:t>
+            </a:r>
+            <a:r>
+              <a:rPr lang="en-US" altLang="ko-KR" dirty="0" smtClean="0"/>
+              <a:t>, </a:t>
+            </a:r>
+            <a:r>
+              <a:rPr lang="ko-KR" altLang="en-US" dirty="0" err="1" smtClean="0"/>
+              <a:t>ㅁ</a:t>
+            </a:r>
+            <a:r>
+              <a:rPr lang="en-US" altLang="ko-KR" dirty="0" smtClean="0"/>
+              <a:t>, </a:t>
+            </a:r>
+            <a:r>
+              <a:rPr lang="ko-KR" altLang="en-US" dirty="0" err="1" smtClean="0"/>
+              <a:t>ㅇ</a:t>
+            </a:r>
+            <a:r>
+              <a:rPr lang="en-US" altLang="ko-KR" dirty="0" smtClean="0"/>
+              <a:t>”)</a:t>
+            </a:r>
+            <a:r>
+              <a:rPr lang="ko-KR" altLang="en-US" dirty="0" smtClean="0"/>
+              <a:t>에 따라서도 다른 </a:t>
+            </a:r>
+            <a:r>
+              <a:rPr lang="en-US" altLang="ko-KR" dirty="0" smtClean="0"/>
+              <a:t>formant </a:t>
+            </a:r>
+            <a:r>
+              <a:rPr lang="ko-KR" altLang="en-US" dirty="0" smtClean="0"/>
+              <a:t>분포가 이루어 진다</a:t>
+            </a:r>
+            <a:r>
+              <a:rPr lang="en-US" altLang="ko-KR" dirty="0" smtClean="0"/>
+              <a:t>(</a:t>
+            </a:r>
+            <a:r>
+              <a:rPr lang="ko-KR" altLang="en-US" dirty="0" smtClean="0"/>
+              <a:t>이중 모음 제외</a:t>
+            </a:r>
+            <a:r>
+              <a:rPr lang="en-US" altLang="ko-KR" dirty="0" smtClean="0"/>
+              <a:t>).</a:t>
+            </a:r>
+            <a:endParaRPr lang="ko-KR" altLang="en-US" dirty="0"/>
+          </a:p>
+        </p:txBody>
+      </p:sp>
+      <p:pic>
+        <p:nvPicPr>
+          <p:cNvPr id="1026" name="Picture 2" descr="https://upload.wikimedia.org/wikipedia/commons/7/77/Spectrogram_-iua-.png"/>
+          <p:cNvPicPr>
+            <a:picLocks noChangeAspect="1" noChangeArrowheads="1"/>
+          </p:cNvPicPr>
+          <p:nvPr/>
+        </p:nvPicPr>
+        <p:blipFill>
+          <a:blip r:embed="rId2" cstate="print">
+            <a:extLst>
+              <a:ext uri="{28A0092B-C50C-407E-A947-70E740481C1C}">
+                <a14:useLocalDpi xmlns:a14="http://schemas.microsoft.com/office/drawing/2010/main" val="0"/>
+              </a:ext>
+            </a:extLst>
+          </a:blip>
+          <a:srcRect/>
+          <a:stretch>
+            <a:fillRect/>
+          </a:stretch>
+        </p:blipFill>
+        <p:spPr bwMode="auto">
+          <a:xfrm>
+            <a:off x="6804247" y="2361318"/>
+            <a:ext cx="2067023" cy="2423396"/>
+          </a:xfrm>
+          <a:prstGeom prst="rect">
+            <a:avLst/>
+          </a:prstGeom>
+          <a:noFill/>
+          <a:extLst>
+            <a:ext uri="{909E8E84-426E-40DD-AFC4-6F175D3DCCD1}">
+              <a14:hiddenFill xmlns:a14="http://schemas.microsoft.com/office/drawing/2010/main">
+                <a:solidFill>
+                  <a:srgbClr val="FFFFFF"/>
+                </a:solidFill>
+              </a14:hiddenFill>
+            </a:ext>
+          </a:extLst>
+        </p:spPr>
+      </p:pic>
+      <p:sp>
+        <p:nvSpPr>
+          <p:cNvPr id="17" name="TextBox 16"/>
+          <p:cNvSpPr txBox="1"/>
+          <p:nvPr/>
+        </p:nvSpPr>
+        <p:spPr>
+          <a:xfrm>
+            <a:off x="437362" y="5787588"/>
+            <a:ext cx="6798934" cy="369332"/>
+          </a:xfrm>
+          <a:prstGeom prst="rect">
+            <a:avLst/>
+          </a:prstGeom>
+          <a:noFill/>
+        </p:spPr>
+        <p:txBody>
+          <a:bodyPr wrap="square" rtlCol="0">
+            <a:spAutoFit/>
+          </a:bodyPr>
+          <a:lstStyle/>
+          <a:p>
+            <a:pPr marL="285750" indent="-285750">
+              <a:buFont typeface="Arial" panose="020B0604020202020204" pitchFamily="34" charset="0"/>
+              <a:buChar char="•"/>
+            </a:pPr>
+            <a:r>
+              <a:rPr lang="en-US" altLang="ko-KR" dirty="0" smtClean="0"/>
+              <a:t>https</a:t>
+            </a:r>
+            <a:r>
+              <a:rPr lang="en-US" altLang="ko-KR" dirty="0"/>
+              <a:t>://en.wikipedia.org/wiki/Formant</a:t>
+            </a:r>
+            <a:endParaRPr lang="ko-KR" altLang="en-US" dirty="0"/>
           </a:p>
         </p:txBody>
       </p:sp>
     </p:spTree>
     <p:extLst>
       <p:ext uri="{BB962C8B-B14F-4D97-AF65-F5344CB8AC3E}">
-        <p14:creationId xmlns:p14="http://schemas.microsoft.com/office/powerpoint/2010/main" val="992091126"/>
+        <p14:creationId xmlns:p14="http://schemas.microsoft.com/office/powerpoint/2010/main" val="3358550535"/>
       </p:ext>
     </p:extLst>
   </p:cSld>
@@ -22035,14 +22347,6 @@
 <file path=ppt/slides/slide25.xml><?xml version="1.0" encoding="utf-8"?>
 <p:sld xmlns:a="http://schemas.openxmlformats.org/drawingml/2006/main" xmlns:r="http://schemas.openxmlformats.org/officeDocument/2006/relationships" xmlns:p="http://schemas.openxmlformats.org/presentationml/2006/main">
   <p:cSld>
-    <p:bg>
-      <p:bgPr>
-        <a:solidFill>
-          <a:schemeClr val="bg1"/>
-        </a:solidFill>
-        <a:effectLst/>
-      </p:bgPr>
-    </p:bg>
     <p:spTree>
       <p:nvGrpSpPr>
         <p:cNvPr id="1" name=""/>
@@ -22712,1045 +23016,6 @@
       </p:sp>
       <p:sp>
         <p:nvSpPr>
-          <p:cNvPr id="13" name="TextBox 12"/>
-          <p:cNvSpPr txBox="1"/>
-          <p:nvPr/>
-        </p:nvSpPr>
-        <p:spPr>
-          <a:xfrm>
-            <a:off x="899592" y="956232"/>
-            <a:ext cx="5544616" cy="4585871"/>
-          </a:xfrm>
-          <a:prstGeom prst="rect">
-            <a:avLst/>
-          </a:prstGeom>
-          <a:noFill/>
-        </p:spPr>
-        <p:txBody>
-          <a:bodyPr wrap="square" rtlCol="0">
-            <a:spAutoFit/>
-          </a:bodyPr>
-          <a:lstStyle/>
-          <a:p>
-            <a:r>
-              <a:rPr lang="en-US" altLang="ko-KR" sz="4000" dirty="0" smtClean="0"/>
-              <a:t>Formant Analysis</a:t>
-            </a:r>
-          </a:p>
-          <a:p>
-            <a:pPr marL="285750" indent="-285750">
-              <a:buFont typeface="Arial" panose="020B0604020202020204" pitchFamily="34" charset="0"/>
-              <a:buChar char="•"/>
-            </a:pPr>
-            <a:endParaRPr lang="en-US" altLang="ko-KR" dirty="0" smtClean="0"/>
-          </a:p>
-          <a:p>
-            <a:pPr marL="285750" indent="-285750">
-              <a:buFont typeface="Arial" panose="020B0604020202020204" pitchFamily="34" charset="0"/>
-              <a:buChar char="•"/>
-            </a:pPr>
-            <a:r>
-              <a:rPr lang="ko-KR" altLang="en-US" dirty="0" smtClean="0"/>
-              <a:t>사람의 음성을 인식할 수 있는 것은 여러 가지 요소들이 있으나 그 대표적인 것이 바로 </a:t>
-            </a:r>
-            <a:r>
-              <a:rPr lang="en-US" altLang="ko-KR" dirty="0" smtClean="0"/>
-              <a:t>formant</a:t>
-            </a:r>
-            <a:r>
-              <a:rPr lang="ko-KR" altLang="en-US" dirty="0" smtClean="0"/>
-              <a:t>임</a:t>
-            </a:r>
-            <a:r>
-              <a:rPr lang="en-US" altLang="ko-KR" dirty="0" smtClean="0"/>
-              <a:t>.</a:t>
-            </a:r>
-          </a:p>
-          <a:p>
-            <a:pPr marL="285750" indent="-285750">
-              <a:buFont typeface="Arial" panose="020B0604020202020204" pitchFamily="34" charset="0"/>
-              <a:buChar char="•"/>
-            </a:pPr>
-            <a:endParaRPr lang="en-US" altLang="ko-KR" dirty="0" smtClean="0"/>
-          </a:p>
-          <a:p>
-            <a:pPr marL="285750" indent="-285750">
-              <a:buFont typeface="Arial" panose="020B0604020202020204" pitchFamily="34" charset="0"/>
-              <a:buChar char="•"/>
-            </a:pPr>
-            <a:r>
-              <a:rPr lang="en-US" altLang="ko-KR" dirty="0" smtClean="0"/>
-              <a:t>formant </a:t>
-            </a:r>
-            <a:r>
-              <a:rPr lang="ko-KR" altLang="en-US" dirty="0" smtClean="0"/>
-              <a:t>정보는 모음에 따라 사람마다 조금씩 다 다르면서도</a:t>
-            </a:r>
-            <a:r>
-              <a:rPr lang="en-US" altLang="ko-KR" dirty="0" smtClean="0"/>
-              <a:t>, </a:t>
-            </a:r>
-            <a:r>
-              <a:rPr lang="ko-KR" altLang="en-US" dirty="0" smtClean="0"/>
-              <a:t>어느 정도 동일한 대역의 값을 가지고 있다</a:t>
-            </a:r>
-            <a:r>
-              <a:rPr lang="en-US" altLang="ko-KR" dirty="0" smtClean="0"/>
-              <a:t>.</a:t>
-            </a:r>
-          </a:p>
-          <a:p>
-            <a:pPr marL="285750" indent="-285750">
-              <a:buFont typeface="Arial" panose="020B0604020202020204" pitchFamily="34" charset="0"/>
-              <a:buChar char="•"/>
-            </a:pPr>
-            <a:endParaRPr lang="en-US" altLang="ko-KR" dirty="0" smtClean="0"/>
-          </a:p>
-          <a:p>
-            <a:pPr marL="285750" indent="-285750">
-              <a:buFont typeface="Arial" panose="020B0604020202020204" pitchFamily="34" charset="0"/>
-              <a:buChar char="•"/>
-            </a:pPr>
-            <a:r>
-              <a:rPr lang="ko-KR" altLang="en-US" dirty="0" smtClean="0"/>
-              <a:t>대부분의 논문이나 자료는 외국인</a:t>
-            </a:r>
-            <a:r>
-              <a:rPr lang="en-US" altLang="ko-KR" dirty="0" smtClean="0"/>
-              <a:t>(</a:t>
-            </a:r>
-            <a:r>
-              <a:rPr lang="ko-KR" altLang="en-US" dirty="0" smtClean="0"/>
-              <a:t>미국인</a:t>
-            </a:r>
-            <a:r>
-              <a:rPr lang="en-US" altLang="ko-KR" dirty="0" smtClean="0"/>
-              <a:t>)</a:t>
-            </a:r>
-            <a:r>
-              <a:rPr lang="ko-KR" altLang="en-US" dirty="0" smtClean="0"/>
-              <a:t>의 모음</a:t>
-            </a:r>
-            <a:r>
-              <a:rPr lang="en-US" altLang="ko-KR" dirty="0" smtClean="0"/>
-              <a:t>(AEIOU)</a:t>
-            </a:r>
-            <a:r>
-              <a:rPr lang="ko-KR" altLang="en-US" dirty="0" smtClean="0"/>
-              <a:t>에 대한 분석이 주를 이루고 있다</a:t>
-            </a:r>
-            <a:r>
-              <a:rPr lang="en-US" altLang="ko-KR" dirty="0" smtClean="0"/>
-              <a:t>.</a:t>
-            </a:r>
-          </a:p>
-          <a:p>
-            <a:pPr marL="285750" indent="-285750">
-              <a:buFont typeface="Arial" panose="020B0604020202020204" pitchFamily="34" charset="0"/>
-              <a:buChar char="•"/>
-            </a:pPr>
-            <a:endParaRPr lang="en-US" altLang="ko-KR" dirty="0" smtClean="0"/>
-          </a:p>
-          <a:p>
-            <a:pPr marL="285750" indent="-285750">
-              <a:buFont typeface="Arial" panose="020B0604020202020204" pitchFamily="34" charset="0"/>
-              <a:buChar char="•"/>
-            </a:pPr>
-            <a:r>
-              <a:rPr lang="ko-KR" altLang="en-US" dirty="0" smtClean="0"/>
-              <a:t>한국어의 경우 </a:t>
-            </a:r>
-            <a:r>
-              <a:rPr lang="en-US" altLang="ko-KR" dirty="0" smtClean="0"/>
-              <a:t>“</a:t>
-            </a:r>
-            <a:r>
-              <a:rPr lang="ko-KR" altLang="en-US" dirty="0" err="1" smtClean="0"/>
-              <a:t>ㅏ</a:t>
-            </a:r>
-            <a:r>
-              <a:rPr lang="en-US" altLang="ko-KR" dirty="0" smtClean="0"/>
-              <a:t>, </a:t>
-            </a:r>
-            <a:r>
-              <a:rPr lang="ko-KR" altLang="en-US" dirty="0" err="1" smtClean="0"/>
-              <a:t>ㅔ</a:t>
-            </a:r>
-            <a:r>
-              <a:rPr lang="en-US" altLang="ko-KR" dirty="0" smtClean="0"/>
-              <a:t>, </a:t>
-            </a:r>
-            <a:r>
-              <a:rPr lang="ko-KR" altLang="en-US" dirty="0" err="1" smtClean="0"/>
-              <a:t>ㅣ</a:t>
-            </a:r>
-            <a:r>
-              <a:rPr lang="en-US" altLang="ko-KR" dirty="0" smtClean="0"/>
-              <a:t>, </a:t>
-            </a:r>
-            <a:r>
-              <a:rPr lang="ko-KR" altLang="en-US" dirty="0" err="1" smtClean="0"/>
-              <a:t>ㅗ</a:t>
-            </a:r>
-            <a:r>
-              <a:rPr lang="en-US" altLang="ko-KR" dirty="0" smtClean="0"/>
-              <a:t>, </a:t>
-            </a:r>
-            <a:r>
-              <a:rPr lang="ko-KR" altLang="en-US" dirty="0" err="1" smtClean="0"/>
-              <a:t>ㅜ</a:t>
-            </a:r>
-            <a:r>
-              <a:rPr lang="en-US" altLang="ko-KR" dirty="0" smtClean="0"/>
-              <a:t>”</a:t>
-            </a:r>
-            <a:r>
-              <a:rPr lang="ko-KR" altLang="en-US" dirty="0" smtClean="0"/>
-              <a:t> 뿐만 아니라 종성</a:t>
-            </a:r>
-            <a:r>
-              <a:rPr lang="en-US" altLang="ko-KR" dirty="0" smtClean="0"/>
-              <a:t>(“</a:t>
-            </a:r>
-            <a:r>
-              <a:rPr lang="ko-KR" altLang="en-US" dirty="0" smtClean="0"/>
-              <a:t>ㄴ</a:t>
-            </a:r>
-            <a:r>
-              <a:rPr lang="en-US" altLang="ko-KR" dirty="0" smtClean="0"/>
-              <a:t>, </a:t>
-            </a:r>
-            <a:r>
-              <a:rPr lang="ko-KR" altLang="en-US" dirty="0" smtClean="0"/>
-              <a:t>ㄹ</a:t>
-            </a:r>
-            <a:r>
-              <a:rPr lang="en-US" altLang="ko-KR" dirty="0" smtClean="0"/>
-              <a:t>, </a:t>
-            </a:r>
-            <a:r>
-              <a:rPr lang="ko-KR" altLang="en-US" dirty="0" err="1" smtClean="0"/>
-              <a:t>ㅁ</a:t>
-            </a:r>
-            <a:r>
-              <a:rPr lang="en-US" altLang="ko-KR" dirty="0" smtClean="0"/>
-              <a:t>, </a:t>
-            </a:r>
-            <a:r>
-              <a:rPr lang="ko-KR" altLang="en-US" dirty="0" err="1" smtClean="0"/>
-              <a:t>ㅇ</a:t>
-            </a:r>
-            <a:r>
-              <a:rPr lang="en-US" altLang="ko-KR" dirty="0" smtClean="0"/>
-              <a:t>”)</a:t>
-            </a:r>
-            <a:r>
-              <a:rPr lang="ko-KR" altLang="en-US" dirty="0" smtClean="0"/>
-              <a:t>에 따라서도 다른 </a:t>
-            </a:r>
-            <a:r>
-              <a:rPr lang="en-US" altLang="ko-KR" dirty="0" smtClean="0"/>
-              <a:t>formant </a:t>
-            </a:r>
-            <a:r>
-              <a:rPr lang="ko-KR" altLang="en-US" dirty="0" smtClean="0"/>
-              <a:t>분포가 이루어 진다</a:t>
-            </a:r>
-            <a:r>
-              <a:rPr lang="en-US" altLang="ko-KR" dirty="0" smtClean="0"/>
-              <a:t>(</a:t>
-            </a:r>
-            <a:r>
-              <a:rPr lang="ko-KR" altLang="en-US" dirty="0" smtClean="0"/>
-              <a:t>이중 모음 제외</a:t>
-            </a:r>
-            <a:r>
-              <a:rPr lang="en-US" altLang="ko-KR" dirty="0" smtClean="0"/>
-              <a:t>).</a:t>
-            </a:r>
-            <a:endParaRPr lang="ko-KR" altLang="en-US" dirty="0"/>
-          </a:p>
-        </p:txBody>
-      </p:sp>
-      <p:pic>
-        <p:nvPicPr>
-          <p:cNvPr id="1026" name="Picture 2" descr="https://upload.wikimedia.org/wikipedia/commons/7/77/Spectrogram_-iua-.png"/>
-          <p:cNvPicPr>
-            <a:picLocks noChangeAspect="1" noChangeArrowheads="1"/>
-          </p:cNvPicPr>
-          <p:nvPr/>
-        </p:nvPicPr>
-        <p:blipFill>
-          <a:blip r:embed="rId2" cstate="print">
-            <a:extLst>
-              <a:ext uri="{28A0092B-C50C-407E-A947-70E740481C1C}">
-                <a14:useLocalDpi xmlns:a14="http://schemas.microsoft.com/office/drawing/2010/main" val="0"/>
-              </a:ext>
-            </a:extLst>
-          </a:blip>
-          <a:srcRect/>
-          <a:stretch>
-            <a:fillRect/>
-          </a:stretch>
-        </p:blipFill>
-        <p:spPr bwMode="auto">
-          <a:xfrm>
-            <a:off x="6804247" y="2361318"/>
-            <a:ext cx="2067023" cy="2423396"/>
-          </a:xfrm>
-          <a:prstGeom prst="rect">
-            <a:avLst/>
-          </a:prstGeom>
-          <a:noFill/>
-          <a:extLst>
-            <a:ext uri="{909E8E84-426E-40DD-AFC4-6F175D3DCCD1}">
-              <a14:hiddenFill xmlns:a14="http://schemas.microsoft.com/office/drawing/2010/main">
-                <a:solidFill>
-                  <a:srgbClr val="FFFFFF"/>
-                </a:solidFill>
-              </a14:hiddenFill>
-            </a:ext>
-          </a:extLst>
-        </p:spPr>
-      </p:pic>
-      <p:sp>
-        <p:nvSpPr>
-          <p:cNvPr id="17" name="TextBox 16"/>
-          <p:cNvSpPr txBox="1"/>
-          <p:nvPr/>
-        </p:nvSpPr>
-        <p:spPr>
-          <a:xfrm>
-            <a:off x="437362" y="5787588"/>
-            <a:ext cx="6798934" cy="369332"/>
-          </a:xfrm>
-          <a:prstGeom prst="rect">
-            <a:avLst/>
-          </a:prstGeom>
-          <a:noFill/>
-        </p:spPr>
-        <p:txBody>
-          <a:bodyPr wrap="square" rtlCol="0">
-            <a:spAutoFit/>
-          </a:bodyPr>
-          <a:lstStyle/>
-          <a:p>
-            <a:pPr marL="285750" indent="-285750">
-              <a:buFont typeface="Arial" panose="020B0604020202020204" pitchFamily="34" charset="0"/>
-              <a:buChar char="•"/>
-            </a:pPr>
-            <a:r>
-              <a:rPr lang="en-US" altLang="ko-KR" dirty="0" smtClean="0"/>
-              <a:t>https</a:t>
-            </a:r>
-            <a:r>
-              <a:rPr lang="en-US" altLang="ko-KR" dirty="0"/>
-              <a:t>://en.wikipedia.org/wiki/Formant</a:t>
-            </a:r>
-            <a:endParaRPr lang="ko-KR" altLang="en-US" dirty="0"/>
-          </a:p>
-        </p:txBody>
-      </p:sp>
-    </p:spTree>
-    <p:extLst>
-      <p:ext uri="{BB962C8B-B14F-4D97-AF65-F5344CB8AC3E}">
-        <p14:creationId xmlns:p14="http://schemas.microsoft.com/office/powerpoint/2010/main" val="3358550535"/>
-      </p:ext>
-    </p:extLst>
-  </p:cSld>
-  <p:clrMapOvr>
-    <a:masterClrMapping/>
-  </p:clrMapOvr>
-  <mc:AlternateContent xmlns:mc="http://schemas.openxmlformats.org/markup-compatibility/2006" xmlns:p14="http://schemas.microsoft.com/office/powerpoint/2010/main">
-    <mc:Choice Requires="p14">
-      <p:transition p14:dur="0"/>
-    </mc:Choice>
-    <mc:Fallback xmlns="">
-      <p:transition/>
-    </mc:Fallback>
-  </mc:AlternateContent>
-  <p:timing>
-    <p:tnLst>
-      <p:par>
-        <p:cTn id="1" dur="indefinite" restart="never" nodeType="tmRoot"/>
-      </p:par>
-    </p:tnLst>
-  </p:timing>
-</p:sld>
-</file>
-
-<file path=ppt/slides/slide26.xml><?xml version="1.0" encoding="utf-8"?>
-<p:sld xmlns:a="http://schemas.openxmlformats.org/drawingml/2006/main" xmlns:r="http://schemas.openxmlformats.org/officeDocument/2006/relationships" xmlns:p="http://schemas.openxmlformats.org/presentationml/2006/main">
-  <p:cSld>
-    <p:spTree>
-      <p:nvGrpSpPr>
-        <p:cNvPr id="1" name=""/>
-        <p:cNvGrpSpPr/>
-        <p:nvPr/>
-      </p:nvGrpSpPr>
-      <p:grpSpPr>
-        <a:xfrm>
-          <a:off x="0" y="0"/>
-          <a:ext cx="0" cy="0"/>
-          <a:chOff x="0" y="0"/>
-          <a:chExt cx="0" cy="0"/>
-        </a:xfrm>
-      </p:grpSpPr>
-      <p:sp>
-        <p:nvSpPr>
-          <p:cNvPr id="8" name="한쪽 모서리가 둥근 사각형 7"/>
-          <p:cNvSpPr/>
-          <p:nvPr/>
-        </p:nvSpPr>
-        <p:spPr>
-          <a:xfrm rot="10800000" flipH="1">
-            <a:off x="0" y="-248"/>
-            <a:ext cx="376307" cy="2637160"/>
-          </a:xfrm>
-          <a:prstGeom prst="round1Rect">
-            <a:avLst/>
-          </a:prstGeom>
-          <a:solidFill>
-            <a:schemeClr val="tx1">
-              <a:lumMod val="75000"/>
-              <a:lumOff val="25000"/>
-            </a:schemeClr>
-          </a:solidFill>
-          <a:ln>
-            <a:solidFill>
-              <a:schemeClr val="tx1">
-                <a:lumMod val="75000"/>
-                <a:lumOff val="25000"/>
-              </a:schemeClr>
-            </a:solidFill>
-          </a:ln>
-        </p:spPr>
-        <p:style>
-          <a:lnRef idx="2">
-            <a:schemeClr val="accent1">
-              <a:shade val="50000"/>
-            </a:schemeClr>
-          </a:lnRef>
-          <a:fillRef idx="1">
-            <a:schemeClr val="accent1"/>
-          </a:fillRef>
-          <a:effectRef idx="0">
-            <a:schemeClr val="accent1"/>
-          </a:effectRef>
-          <a:fontRef idx="minor">
-            <a:schemeClr val="lt1"/>
-          </a:fontRef>
-        </p:style>
-        <p:txBody>
-          <a:bodyPr rtlCol="0" anchor="ctr"/>
-          <a:lstStyle/>
-          <a:p>
-            <a:pPr algn="ctr"/>
-            <a:endParaRPr lang="ko-KR" altLang="en-US">
-              <a:solidFill>
-                <a:schemeClr val="bg1"/>
-              </a:solidFill>
-            </a:endParaRPr>
-          </a:p>
-        </p:txBody>
-      </p:sp>
-      <p:grpSp>
-        <p:nvGrpSpPr>
-          <p:cNvPr id="18" name="그룹 17"/>
-          <p:cNvGrpSpPr/>
-          <p:nvPr/>
-        </p:nvGrpSpPr>
-        <p:grpSpPr>
-          <a:xfrm>
-            <a:off x="230312" y="358056"/>
-            <a:ext cx="8662168" cy="6158904"/>
-            <a:chOff x="251520" y="6309320"/>
-            <a:chExt cx="8662168" cy="6158904"/>
-          </a:xfrm>
-        </p:grpSpPr>
-        <p:sp>
-          <p:nvSpPr>
-            <p:cNvPr id="15" name="직사각형 14"/>
-            <p:cNvSpPr/>
-            <p:nvPr/>
-          </p:nvSpPr>
-          <p:spPr>
-            <a:xfrm>
-              <a:off x="251520" y="6309320"/>
-              <a:ext cx="8640960" cy="360040"/>
-            </a:xfrm>
-            <a:prstGeom prst="rect">
-              <a:avLst/>
-            </a:prstGeom>
-            <a:solidFill>
-              <a:schemeClr val="tx1">
-                <a:lumMod val="75000"/>
-                <a:lumOff val="25000"/>
-              </a:schemeClr>
-            </a:solidFill>
-            <a:ln>
-              <a:solidFill>
-                <a:schemeClr val="tx1">
-                  <a:lumMod val="75000"/>
-                  <a:lumOff val="25000"/>
-                </a:schemeClr>
-              </a:solidFill>
-            </a:ln>
-          </p:spPr>
-          <p:style>
-            <a:lnRef idx="2">
-              <a:schemeClr val="accent1">
-                <a:shade val="50000"/>
-              </a:schemeClr>
-            </a:lnRef>
-            <a:fillRef idx="1">
-              <a:schemeClr val="accent1"/>
-            </a:fillRef>
-            <a:effectRef idx="0">
-              <a:schemeClr val="accent1"/>
-            </a:effectRef>
-            <a:fontRef idx="minor">
-              <a:schemeClr val="lt1"/>
-            </a:fontRef>
-          </p:style>
-          <p:txBody>
-            <a:bodyPr rtlCol="0" anchor="ctr"/>
-            <a:lstStyle/>
-            <a:p>
-              <a:pPr algn="ctr"/>
-              <a:endParaRPr lang="ko-KR" altLang="en-US"/>
-            </a:p>
-          </p:txBody>
-        </p:sp>
-        <p:sp>
-          <p:nvSpPr>
-            <p:cNvPr id="16" name="직사각형 15"/>
-            <p:cNvSpPr/>
-            <p:nvPr/>
-          </p:nvSpPr>
-          <p:spPr>
-            <a:xfrm>
-              <a:off x="251520" y="6309320"/>
-              <a:ext cx="360000" cy="360000"/>
-            </a:xfrm>
-            <a:prstGeom prst="rect">
-              <a:avLst/>
-            </a:prstGeom>
-            <a:solidFill>
-              <a:schemeClr val="bg1">
-                <a:lumMod val="75000"/>
-              </a:schemeClr>
-            </a:solidFill>
-            <a:ln>
-              <a:solidFill>
-                <a:schemeClr val="bg1">
-                  <a:lumMod val="75000"/>
-                </a:schemeClr>
-              </a:solidFill>
-            </a:ln>
-          </p:spPr>
-          <p:style>
-            <a:lnRef idx="2">
-              <a:schemeClr val="accent1">
-                <a:shade val="50000"/>
-              </a:schemeClr>
-            </a:lnRef>
-            <a:fillRef idx="1">
-              <a:schemeClr val="accent1"/>
-            </a:fillRef>
-            <a:effectRef idx="0">
-              <a:schemeClr val="accent1"/>
-            </a:effectRef>
-            <a:fontRef idx="minor">
-              <a:schemeClr val="lt1"/>
-            </a:fontRef>
-          </p:style>
-          <p:txBody>
-            <a:bodyPr rtlCol="0" anchor="ctr"/>
-            <a:lstStyle/>
-            <a:p>
-              <a:pPr algn="ctr"/>
-              <a:endParaRPr lang="ko-KR" altLang="en-US"/>
-            </a:p>
-          </p:txBody>
-        </p:sp>
-        <p:sp>
-          <p:nvSpPr>
-            <p:cNvPr id="20" name="직사각형 19"/>
-            <p:cNvSpPr/>
-            <p:nvPr/>
-          </p:nvSpPr>
-          <p:spPr>
-            <a:xfrm>
-              <a:off x="7473528" y="12108184"/>
-              <a:ext cx="1440160" cy="360040"/>
-            </a:xfrm>
-            <a:prstGeom prst="rect">
-              <a:avLst/>
-            </a:prstGeom>
-            <a:solidFill>
-              <a:schemeClr val="tx1">
-                <a:lumMod val="75000"/>
-                <a:lumOff val="25000"/>
-              </a:schemeClr>
-            </a:solidFill>
-            <a:ln>
-              <a:solidFill>
-                <a:schemeClr val="tx1">
-                  <a:lumMod val="75000"/>
-                  <a:lumOff val="25000"/>
-                </a:schemeClr>
-              </a:solidFill>
-            </a:ln>
-          </p:spPr>
-          <p:style>
-            <a:lnRef idx="2">
-              <a:schemeClr val="accent1">
-                <a:shade val="50000"/>
-              </a:schemeClr>
-            </a:lnRef>
-            <a:fillRef idx="1">
-              <a:schemeClr val="accent1"/>
-            </a:fillRef>
-            <a:effectRef idx="0">
-              <a:schemeClr val="accent1"/>
-            </a:effectRef>
-            <a:fontRef idx="minor">
-              <a:schemeClr val="lt1"/>
-            </a:fontRef>
-          </p:style>
-          <p:txBody>
-            <a:bodyPr rtlCol="0" anchor="ctr"/>
-            <a:lstStyle/>
-            <a:p>
-              <a:pPr algn="ctr"/>
-              <a:endParaRPr lang="ko-KR" altLang="en-US"/>
-            </a:p>
-          </p:txBody>
-        </p:sp>
-      </p:grpSp>
-      <p:sp>
-        <p:nvSpPr>
-          <p:cNvPr id="10" name="TextBox 9"/>
-          <p:cNvSpPr txBox="1"/>
-          <p:nvPr/>
-        </p:nvSpPr>
-        <p:spPr>
-          <a:xfrm>
-            <a:off x="277702" y="384919"/>
-            <a:ext cx="996748" cy="307777"/>
-          </a:xfrm>
-          <a:prstGeom prst="rect">
-            <a:avLst/>
-          </a:prstGeom>
-          <a:noFill/>
-        </p:spPr>
-        <p:txBody>
-          <a:bodyPr wrap="none" rtlCol="0">
-            <a:spAutoFit/>
-          </a:bodyPr>
-          <a:lstStyle/>
-          <a:p>
-            <a:r>
-              <a:rPr lang="en-US" altLang="ko-KR" sz="1400" dirty="0" smtClean="0">
-                <a:ln>
-                  <a:solidFill>
-                    <a:schemeClr val="bg1">
-                      <a:alpha val="0"/>
-                    </a:schemeClr>
-                  </a:solidFill>
-                </a:ln>
-                <a:solidFill>
-                  <a:schemeClr val="tx1">
-                    <a:lumMod val="75000"/>
-                    <a:lumOff val="25000"/>
-                  </a:schemeClr>
-                </a:solidFill>
-                <a:latin typeface="Impact" panose="020B0806030902050204" pitchFamily="34" charset="0"/>
-                <a:ea typeface="맑은 고딕" panose="020B0503020000020004" pitchFamily="50" charset="-127"/>
-              </a:rPr>
-              <a:t>05</a:t>
-            </a:r>
-            <a:r>
-              <a:rPr lang="en-US" altLang="ko-KR" sz="1400" dirty="0" smtClean="0">
-                <a:ln>
-                  <a:solidFill>
-                    <a:schemeClr val="bg1">
-                      <a:alpha val="0"/>
-                    </a:schemeClr>
-                  </a:solidFill>
-                </a:ln>
-                <a:solidFill>
-                  <a:schemeClr val="bg1"/>
-                </a:solidFill>
-                <a:latin typeface="맑은 고딕" panose="020B0503020000020004" pitchFamily="50" charset="-127"/>
-                <a:ea typeface="맑은 고딕" panose="020B0503020000020004" pitchFamily="50" charset="-127"/>
-              </a:rPr>
-              <a:t>  TODO</a:t>
-            </a:r>
-            <a:endParaRPr lang="ko-KR" altLang="en-US" sz="1400" dirty="0">
-              <a:ln>
-                <a:solidFill>
-                  <a:schemeClr val="bg1">
-                    <a:alpha val="0"/>
-                  </a:schemeClr>
-                </a:solidFill>
-              </a:ln>
-              <a:solidFill>
-                <a:schemeClr val="bg1"/>
-              </a:solidFill>
-              <a:latin typeface="맑은 고딕" panose="020B0503020000020004" pitchFamily="50" charset="-127"/>
-              <a:ea typeface="맑은 고딕" panose="020B0503020000020004" pitchFamily="50" charset="-127"/>
-            </a:endParaRPr>
-          </a:p>
-        </p:txBody>
-      </p:sp>
-      <p:sp>
-        <p:nvSpPr>
-          <p:cNvPr id="19" name="한쪽 모서리가 둥근 사각형 18"/>
-          <p:cNvSpPr/>
-          <p:nvPr/>
-        </p:nvSpPr>
-        <p:spPr>
-          <a:xfrm flipH="1">
-            <a:off x="8767693" y="4220840"/>
-            <a:ext cx="376307" cy="2637160"/>
-          </a:xfrm>
-          <a:prstGeom prst="round1Rect">
-            <a:avLst/>
-          </a:prstGeom>
-          <a:solidFill>
-            <a:schemeClr val="tx1">
-              <a:lumMod val="75000"/>
-              <a:lumOff val="25000"/>
-            </a:schemeClr>
-          </a:solidFill>
-          <a:ln>
-            <a:solidFill>
-              <a:schemeClr val="tx1">
-                <a:lumMod val="75000"/>
-                <a:lumOff val="25000"/>
-              </a:schemeClr>
-            </a:solidFill>
-          </a:ln>
-        </p:spPr>
-        <p:style>
-          <a:lnRef idx="2">
-            <a:schemeClr val="accent1">
-              <a:shade val="50000"/>
-            </a:schemeClr>
-          </a:lnRef>
-          <a:fillRef idx="1">
-            <a:schemeClr val="accent1"/>
-          </a:fillRef>
-          <a:effectRef idx="0">
-            <a:schemeClr val="accent1"/>
-          </a:effectRef>
-          <a:fontRef idx="minor">
-            <a:schemeClr val="lt1"/>
-          </a:fontRef>
-        </p:style>
-        <p:txBody>
-          <a:bodyPr rtlCol="0" anchor="ctr"/>
-          <a:lstStyle/>
-          <a:p>
-            <a:pPr algn="ctr"/>
-            <a:endParaRPr lang="ko-KR" altLang="en-US">
-              <a:solidFill>
-                <a:schemeClr val="bg1"/>
-              </a:solidFill>
-            </a:endParaRPr>
-          </a:p>
-        </p:txBody>
-      </p:sp>
-      <p:sp>
-        <p:nvSpPr>
-          <p:cNvPr id="25" name="TextBox 24"/>
-          <p:cNvSpPr txBox="1"/>
-          <p:nvPr/>
-        </p:nvSpPr>
-        <p:spPr>
-          <a:xfrm>
-            <a:off x="7372583" y="5874543"/>
-            <a:ext cx="697627" cy="307777"/>
-          </a:xfrm>
-          <a:prstGeom prst="rect">
-            <a:avLst/>
-          </a:prstGeom>
-          <a:noFill/>
-        </p:spPr>
-        <p:txBody>
-          <a:bodyPr wrap="none" rtlCol="0">
-            <a:spAutoFit/>
-          </a:bodyPr>
-          <a:lstStyle/>
-          <a:p>
-            <a:r>
-              <a:rPr lang="en-US" altLang="ko-KR" sz="1400" dirty="0" smtClean="0">
-                <a:ln>
-                  <a:solidFill>
-                    <a:schemeClr val="bg1">
-                      <a:alpha val="0"/>
-                    </a:schemeClr>
-                  </a:solidFill>
-                </a:ln>
-                <a:solidFill>
-                  <a:schemeClr val="tx1">
-                    <a:lumMod val="75000"/>
-                    <a:lumOff val="25000"/>
-                  </a:schemeClr>
-                </a:solidFill>
-                <a:latin typeface="맑은 고딕" panose="020B0503020000020004" pitchFamily="50" charset="-127"/>
-                <a:ea typeface="맑은 고딕" panose="020B0503020000020004" pitchFamily="50" charset="-127"/>
-              </a:rPr>
-              <a:t>A.M.R.</a:t>
-            </a:r>
-            <a:endParaRPr lang="ko-KR" altLang="en-US" sz="1400" dirty="0">
-              <a:ln>
-                <a:solidFill>
-                  <a:schemeClr val="bg1">
-                    <a:alpha val="0"/>
-                  </a:schemeClr>
-                </a:solidFill>
-              </a:ln>
-              <a:solidFill>
-                <a:schemeClr val="tx1">
-                  <a:lumMod val="75000"/>
-                  <a:lumOff val="25000"/>
-                </a:schemeClr>
-              </a:solidFill>
-              <a:latin typeface="맑은 고딕" panose="020B0503020000020004" pitchFamily="50" charset="-127"/>
-              <a:ea typeface="맑은 고딕" panose="020B0503020000020004" pitchFamily="50" charset="-127"/>
-            </a:endParaRPr>
-          </a:p>
-        </p:txBody>
-      </p:sp>
-      <p:sp>
-        <p:nvSpPr>
-          <p:cNvPr id="11" name="직사각형 10"/>
-          <p:cNvSpPr/>
-          <p:nvPr/>
-        </p:nvSpPr>
-        <p:spPr>
-          <a:xfrm>
-            <a:off x="-64" y="6624736"/>
-            <a:ext cx="9144000" cy="260648"/>
-          </a:xfrm>
-          <a:prstGeom prst="rect">
-            <a:avLst/>
-          </a:prstGeom>
-          <a:solidFill>
-            <a:schemeClr val="tx1">
-              <a:lumMod val="75000"/>
-              <a:lumOff val="25000"/>
-            </a:schemeClr>
-          </a:solidFill>
-          <a:ln>
-            <a:solidFill>
-              <a:schemeClr val="tx1">
-                <a:lumMod val="75000"/>
-                <a:lumOff val="25000"/>
-              </a:schemeClr>
-            </a:solidFill>
-          </a:ln>
-        </p:spPr>
-        <p:style>
-          <a:lnRef idx="2">
-            <a:schemeClr val="accent1">
-              <a:shade val="50000"/>
-            </a:schemeClr>
-          </a:lnRef>
-          <a:fillRef idx="1">
-            <a:schemeClr val="accent1"/>
-          </a:fillRef>
-          <a:effectRef idx="0">
-            <a:schemeClr val="accent1"/>
-          </a:effectRef>
-          <a:fontRef idx="minor">
-            <a:schemeClr val="lt1"/>
-          </a:fontRef>
-        </p:style>
-        <p:txBody>
-          <a:bodyPr rot="0" spcFirstLastPara="0" vert="horz" wrap="square" lIns="91440" tIns="45720" rIns="91440" bIns="45720" numCol="1" spcCol="0" rtlCol="0" fromWordArt="0" anchor="ctr" anchorCtr="0" forceAA="0" compatLnSpc="1">
-            <a:prstTxWarp prst="textNoShape">
-              <a:avLst/>
-            </a:prstTxWarp>
-            <a:noAutofit/>
-          </a:bodyPr>
-          <a:lstStyle>
-            <a:defPPr>
-              <a:defRPr lang="ko-KR"/>
-            </a:defPPr>
-            <a:lvl1pPr marL="0" algn="l" defTabSz="914400" rtl="0" eaLnBrk="1" latinLnBrk="1" hangingPunct="1">
-              <a:defRPr sz="1800" kern="1200">
-                <a:solidFill>
-                  <a:schemeClr val="lt1"/>
-                </a:solidFill>
-                <a:latin typeface="+mn-lt"/>
-                <a:ea typeface="+mn-ea"/>
-                <a:cs typeface="+mn-cs"/>
-              </a:defRPr>
-            </a:lvl1pPr>
-            <a:lvl2pPr marL="457200" algn="l" defTabSz="914400" rtl="0" eaLnBrk="1" latinLnBrk="1" hangingPunct="1">
-              <a:defRPr sz="1800" kern="1200">
-                <a:solidFill>
-                  <a:schemeClr val="lt1"/>
-                </a:solidFill>
-                <a:latin typeface="+mn-lt"/>
-                <a:ea typeface="+mn-ea"/>
-                <a:cs typeface="+mn-cs"/>
-              </a:defRPr>
-            </a:lvl2pPr>
-            <a:lvl3pPr marL="914400" algn="l" defTabSz="914400" rtl="0" eaLnBrk="1" latinLnBrk="1" hangingPunct="1">
-              <a:defRPr sz="1800" kern="1200">
-                <a:solidFill>
-                  <a:schemeClr val="lt1"/>
-                </a:solidFill>
-                <a:latin typeface="+mn-lt"/>
-                <a:ea typeface="+mn-ea"/>
-                <a:cs typeface="+mn-cs"/>
-              </a:defRPr>
-            </a:lvl3pPr>
-            <a:lvl4pPr marL="1371600" algn="l" defTabSz="914400" rtl="0" eaLnBrk="1" latinLnBrk="1" hangingPunct="1">
-              <a:defRPr sz="1800" kern="1200">
-                <a:solidFill>
-                  <a:schemeClr val="lt1"/>
-                </a:solidFill>
-                <a:latin typeface="+mn-lt"/>
-                <a:ea typeface="+mn-ea"/>
-                <a:cs typeface="+mn-cs"/>
-              </a:defRPr>
-            </a:lvl4pPr>
-            <a:lvl5pPr marL="1828800" algn="l" defTabSz="914400" rtl="0" eaLnBrk="1" latinLnBrk="1" hangingPunct="1">
-              <a:defRPr sz="1800" kern="1200">
-                <a:solidFill>
-                  <a:schemeClr val="lt1"/>
-                </a:solidFill>
-                <a:latin typeface="+mn-lt"/>
-                <a:ea typeface="+mn-ea"/>
-                <a:cs typeface="+mn-cs"/>
-              </a:defRPr>
-            </a:lvl5pPr>
-            <a:lvl6pPr marL="2286000" algn="l" defTabSz="914400" rtl="0" eaLnBrk="1" latinLnBrk="1" hangingPunct="1">
-              <a:defRPr sz="1800" kern="1200">
-                <a:solidFill>
-                  <a:schemeClr val="lt1"/>
-                </a:solidFill>
-                <a:latin typeface="+mn-lt"/>
-                <a:ea typeface="+mn-ea"/>
-                <a:cs typeface="+mn-cs"/>
-              </a:defRPr>
-            </a:lvl6pPr>
-            <a:lvl7pPr marL="2743200" algn="l" defTabSz="914400" rtl="0" eaLnBrk="1" latinLnBrk="1" hangingPunct="1">
-              <a:defRPr sz="1800" kern="1200">
-                <a:solidFill>
-                  <a:schemeClr val="lt1"/>
-                </a:solidFill>
-                <a:latin typeface="+mn-lt"/>
-                <a:ea typeface="+mn-ea"/>
-                <a:cs typeface="+mn-cs"/>
-              </a:defRPr>
-            </a:lvl7pPr>
-            <a:lvl8pPr marL="3200400" algn="l" defTabSz="914400" rtl="0" eaLnBrk="1" latinLnBrk="1" hangingPunct="1">
-              <a:defRPr sz="1800" kern="1200">
-                <a:solidFill>
-                  <a:schemeClr val="lt1"/>
-                </a:solidFill>
-                <a:latin typeface="+mn-lt"/>
-                <a:ea typeface="+mn-ea"/>
-                <a:cs typeface="+mn-cs"/>
-              </a:defRPr>
-            </a:lvl8pPr>
-            <a:lvl9pPr marL="3657600" algn="l" defTabSz="914400" rtl="0" eaLnBrk="1" latinLnBrk="1" hangingPunct="1">
-              <a:defRPr sz="1800" kern="1200">
-                <a:solidFill>
-                  <a:schemeClr val="lt1"/>
-                </a:solidFill>
-                <a:latin typeface="+mn-lt"/>
-                <a:ea typeface="+mn-ea"/>
-                <a:cs typeface="+mn-cs"/>
-              </a:defRPr>
-            </a:lvl9pPr>
-          </a:lstStyle>
-          <a:p>
-            <a:pPr algn="ctr"/>
-            <a:endParaRPr lang="ko-KR" altLang="en-US"/>
-          </a:p>
-        </p:txBody>
-      </p:sp>
-      <p:sp>
-        <p:nvSpPr>
-          <p:cNvPr id="2" name="직사각형 1"/>
-          <p:cNvSpPr/>
-          <p:nvPr/>
-        </p:nvSpPr>
-        <p:spPr>
-          <a:xfrm>
-            <a:off x="560800" y="1052736"/>
-            <a:ext cx="122768" cy="3960440"/>
-          </a:xfrm>
-          <a:prstGeom prst="rect">
-            <a:avLst/>
-          </a:prstGeom>
-          <a:solidFill>
-            <a:schemeClr val="bg1"/>
-          </a:solidFill>
-          <a:ln>
-            <a:solidFill>
-              <a:schemeClr val="bg1"/>
-            </a:solidFill>
-          </a:ln>
-        </p:spPr>
-        <p:style>
-          <a:lnRef idx="2">
-            <a:schemeClr val="accent1">
-              <a:shade val="50000"/>
-            </a:schemeClr>
-          </a:lnRef>
-          <a:fillRef idx="1">
-            <a:schemeClr val="accent1"/>
-          </a:fillRef>
-          <a:effectRef idx="0">
-            <a:schemeClr val="accent1"/>
-          </a:effectRef>
-          <a:fontRef idx="minor">
-            <a:schemeClr val="lt1"/>
-          </a:fontRef>
-        </p:style>
-        <p:txBody>
-          <a:bodyPr rtlCol="0" anchor="ctr"/>
-          <a:lstStyle/>
-          <a:p>
-            <a:pPr algn="ctr"/>
-            <a:endParaRPr lang="ko-KR" altLang="en-US"/>
-          </a:p>
-        </p:txBody>
-      </p:sp>
-      <p:sp>
-        <p:nvSpPr>
-          <p:cNvPr id="6" name="슬라이드 번호 개체 틀 5"/>
-          <p:cNvSpPr>
-            <a:spLocks noGrp="1"/>
-          </p:cNvSpPr>
-          <p:nvPr>
-            <p:ph type="sldNum" sz="quarter" idx="12"/>
-          </p:nvPr>
-        </p:nvSpPr>
-        <p:spPr/>
-        <p:txBody>
-          <a:bodyPr/>
-          <a:lstStyle/>
-          <a:p>
-            <a:fld id="{D6841A54-BA9E-43E7-A209-C0E692E2DAAC}" type="slidenum">
-              <a:rPr lang="ko-KR" altLang="en-US" smtClean="0"/>
-              <a:t>26</a:t>
-            </a:fld>
-            <a:endParaRPr lang="ko-KR" altLang="en-US" dirty="0"/>
-          </a:p>
-        </p:txBody>
-      </p:sp>
-      <p:sp>
-        <p:nvSpPr>
           <p:cNvPr id="21" name="TextBox 20"/>
           <p:cNvSpPr txBox="1"/>
           <p:nvPr/>
@@ -23979,7 +23244,7 @@
 </p:sld>
 </file>
 
-<file path=ppt/slides/slide27.xml><?xml version="1.0" encoding="utf-8"?>
+<file path=ppt/slides/slide26.xml><?xml version="1.0" encoding="utf-8"?>
 <p:sld xmlns:a="http://schemas.openxmlformats.org/drawingml/2006/main" xmlns:r="http://schemas.openxmlformats.org/officeDocument/2006/relationships" xmlns:p="http://schemas.openxmlformats.org/presentationml/2006/main">
   <p:cSld>
     <p:spTree>
@@ -24305,7 +23570,7 @@
           <a:p>
             <a:fld id="{D6841A54-BA9E-43E7-A209-C0E692E2DAAC}" type="slidenum">
               <a:rPr lang="ko-KR" altLang="en-US" smtClean="0"/>
-              <a:t>27</a:t>
+              <a:t>26</a:t>
             </a:fld>
             <a:endParaRPr lang="ko-KR" altLang="en-US" dirty="0"/>
           </a:p>
@@ -24339,7 +23604,7 @@
 </p:sld>
 </file>
 
-<file path=ppt/slides/slide28.xml><?xml version="1.0" encoding="utf-8"?>
+<file path=ppt/slides/slide27.xml><?xml version="1.0" encoding="utf-8"?>
 <p:sld xmlns:a="http://schemas.openxmlformats.org/drawingml/2006/main" xmlns:r="http://schemas.openxmlformats.org/officeDocument/2006/relationships" xmlns:p="http://schemas.openxmlformats.org/presentationml/2006/main">
   <p:cSld>
     <p:spTree>
@@ -24701,7 +23966,7 @@
           <a:p>
             <a:fld id="{D6841A54-BA9E-43E7-A209-C0E692E2DAAC}" type="slidenum">
               <a:rPr lang="ko-KR" altLang="en-US" smtClean="0"/>
-              <a:t>28</a:t>
+              <a:t>27</a:t>
             </a:fld>
             <a:endParaRPr lang="ko-KR" altLang="en-US" dirty="0"/>
           </a:p>
@@ -30646,7 +29911,7 @@
   <a:extraClrSchemeLst/>
   <a:extLst>
     <a:ext uri="{05A4C25C-085E-4340-85A3-A5531E510DB2}">
-      <thm15:themeFamily xmlns:thm15="http://schemas.microsoft.com/office/thememl/2012/main" xmlns="" name="Office Theme" id="{62F939B6-93AF-4DB8-9C6B-D6C7DFDC589F}" vid="{4A3C46E8-61CC-4603-A589-7422A47A8E4A}"/>
+      <thm15:themeFamily xmlns="" xmlns:thm15="http://schemas.microsoft.com/office/thememl/2012/main" name="Office Theme" id="{62F939B6-93AF-4DB8-9C6B-D6C7DFDC589F}" vid="{4A3C46E8-61CC-4603-A589-7422A47A8E4A}"/>
     </a:ext>
   </a:extLst>
 </a:theme>

</xml_diff>

<commit_message>
Add email contact info at the end of the slide
</commit_message>
<xml_diff>
--- a/doc/ppt/[MISCON]AMR_Presentation.pptx
+++ b/doc/ppt/[MISCON]AMR_Presentation.pptx
@@ -23658,10 +23658,10 @@
         </p:nvGrpSpPr>
         <p:grpSpPr>
           <a:xfrm>
-            <a:off x="5154732" y="1268760"/>
-            <a:ext cx="3701476" cy="5219399"/>
-            <a:chOff x="5775392" y="2357363"/>
-            <a:chExt cx="3701476" cy="5219399"/>
+            <a:off x="4355976" y="1268760"/>
+            <a:ext cx="4716256" cy="4203759"/>
+            <a:chOff x="4976636" y="2357363"/>
+            <a:chExt cx="4716256" cy="4203759"/>
           </a:xfrm>
         </p:grpSpPr>
         <p:sp>
@@ -23672,8 +23672,8 @@
           </p:nvSpPr>
           <p:spPr>
             <a:xfrm>
-              <a:off x="6632820" y="5022217"/>
-              <a:ext cx="2844048" cy="2554545"/>
+              <a:off x="4976636" y="5237683"/>
+              <a:ext cx="4716256" cy="1323439"/>
             </a:xfrm>
             <a:prstGeom prst="rect">
               <a:avLst/>
@@ -23681,7 +23681,7 @@
             <a:noFill/>
           </p:spPr>
           <p:txBody>
-            <a:bodyPr wrap="none" rtlCol="0">
+            <a:bodyPr wrap="square" rtlCol="0">
               <a:spAutoFit/>
             </a:bodyPr>
             <a:lstStyle/>
@@ -23701,43 +23701,7 @@
                   <a:latin typeface="Corbel" panose="020B0503020204020204" pitchFamily="34" charset="0"/>
                   <a:ea typeface="-윤고딕350" pitchFamily="18" charset="-127"/>
                 </a:rPr>
-                <a:t>Thank</a:t>
-              </a:r>
-            </a:p>
-            <a:p>
-              <a:r>
-                <a:rPr lang="en-US" altLang="ko-KR" sz="8000" dirty="0">
-                  <a:ln>
-                    <a:solidFill>
-                      <a:schemeClr val="bg1">
-                        <a:alpha val="0"/>
-                      </a:schemeClr>
-                    </a:solidFill>
-                  </a:ln>
-                  <a:solidFill>
-                    <a:srgbClr val="ADCC03"/>
-                  </a:solidFill>
-                  <a:latin typeface="Corbel" panose="020B0503020204020204" pitchFamily="34" charset="0"/>
-                  <a:ea typeface="-윤고딕350" pitchFamily="18" charset="-127"/>
-                </a:rPr>
-                <a:t>Y</a:t>
-              </a:r>
-              <a:r>
-                <a:rPr lang="en-US" altLang="ko-KR" sz="8000" dirty="0" smtClean="0">
-                  <a:ln>
-                    <a:solidFill>
-                      <a:schemeClr val="bg1">
-                        <a:alpha val="0"/>
-                      </a:schemeClr>
-                    </a:solidFill>
-                  </a:ln>
-                  <a:solidFill>
-                    <a:srgbClr val="ADCC03"/>
-                  </a:solidFill>
-                  <a:latin typeface="Corbel" panose="020B0503020204020204" pitchFamily="34" charset="0"/>
-                  <a:ea typeface="-윤고딕350" pitchFamily="18" charset="-127"/>
-                </a:rPr>
-                <a:t>ou</a:t>
+                <a:t>Thank You</a:t>
               </a:r>
               <a:endParaRPr lang="ko-KR" altLang="en-US" sz="8000" dirty="0">
                 <a:ln>
@@ -23969,6 +23933,82 @@
               <a:t>27</a:t>
             </a:fld>
             <a:endParaRPr lang="ko-KR" altLang="en-US" dirty="0"/>
+          </a:p>
+        </p:txBody>
+      </p:sp>
+      <p:sp>
+        <p:nvSpPr>
+          <p:cNvPr id="10" name="TextBox 9"/>
+          <p:cNvSpPr txBox="1"/>
+          <p:nvPr/>
+        </p:nvSpPr>
+        <p:spPr>
+          <a:xfrm>
+            <a:off x="5247097" y="5883386"/>
+            <a:ext cx="3613490" cy="400110"/>
+          </a:xfrm>
+          <a:prstGeom prst="rect">
+            <a:avLst/>
+          </a:prstGeom>
+          <a:noFill/>
+        </p:spPr>
+        <p:txBody>
+          <a:bodyPr wrap="none" rtlCol="0">
+            <a:spAutoFit/>
+          </a:bodyPr>
+          <a:lstStyle/>
+          <a:p>
+            <a:r>
+              <a:rPr lang="ko-KR" altLang="en-US" sz="2000" dirty="0" smtClean="0">
+                <a:ln>
+                  <a:solidFill>
+                    <a:schemeClr val="bg1">
+                      <a:alpha val="0"/>
+                    </a:schemeClr>
+                  </a:solidFill>
+                </a:ln>
+                <a:solidFill>
+                  <a:schemeClr val="bg1">
+                    <a:lumMod val="85000"/>
+                  </a:schemeClr>
+                </a:solidFill>
+                <a:latin typeface="+mn-ea"/>
+              </a:rPr>
+              <a:t>이경문 </a:t>
+            </a:r>
+            <a:r>
+              <a:rPr lang="en-US" altLang="ko-KR" sz="2000" dirty="0" smtClean="0">
+                <a:ln>
+                  <a:solidFill>
+                    <a:schemeClr val="bg1">
+                      <a:alpha val="0"/>
+                    </a:schemeClr>
+                  </a:solidFill>
+                </a:ln>
+                <a:solidFill>
+                  <a:schemeClr val="bg1">
+                    <a:lumMod val="85000"/>
+                  </a:schemeClr>
+                </a:solidFill>
+                <a:latin typeface="+mn-ea"/>
+              </a:rPr>
+              <a:t>gilgil1973@gmail.com</a:t>
+            </a:r>
+            <a:endParaRPr lang="ko-KR" altLang="en-US" sz="2000" dirty="0">
+              <a:ln>
+                <a:solidFill>
+                  <a:schemeClr val="bg1">
+                    <a:alpha val="0"/>
+                  </a:schemeClr>
+                </a:solidFill>
+              </a:ln>
+              <a:solidFill>
+                <a:schemeClr val="bg1">
+                  <a:lumMod val="85000"/>
+                </a:schemeClr>
+              </a:solidFill>
+              <a:latin typeface="+mn-ea"/>
+            </a:endParaRPr>
           </a:p>
         </p:txBody>
       </p:sp>

</xml_diff>